<commit_message>
add plot for t_wait
</commit_message>
<xml_diff>
--- a/presentation/presentation-partitioned-progress.pptx
+++ b/presentation/presentation-partitioned-progress.pptx
@@ -357,7 +357,7 @@
             <a:pPr indent="0" algn="r">
               <a:buNone/>
             </a:pPr>
-            <a:fld id="{9F50C5BA-3B9B-4B44-A0D9-97A3F8B314F0}" type="slidenum">
+            <a:fld id="{F19437E9-740A-48E0-A501-D0C0CF7E2C8E}" type="slidenum">
               <a:rPr b="0" lang="en-US" sz="1400" spc="-1" strike="noStrike">
                 <a:solidFill>
                   <a:srgbClr val="000000"/>
@@ -2579,7 +2579,7 @@
         <p:txBody>
           <a:bodyPr/>
           <a:p>
-            <a:fld id="{177F4889-7634-4691-B033-8A8D54A04159}" type="slidenum">
+            <a:fld id="{39FF55A7-647F-45CD-9954-A7E31C1B4619}" type="slidenum">
               <a:t>&lt;#&gt;</a:t>
             </a:fld>
           </a:p>
@@ -2803,7 +2803,70 @@
                 </a:solidFill>
                 <a:latin typeface="Arial"/>
               </a:rPr>
-              <a:t>Click to edit the title text format</a:t>
+              <a:t>Clic</a:t>
+            </a:r>
+            <a:r>
+              <a:rPr b="0" lang="en-US" sz="4400" spc="-1" strike="noStrike">
+                <a:solidFill>
+                  <a:srgbClr val="000000"/>
+                </a:solidFill>
+                <a:latin typeface="Arial"/>
+              </a:rPr>
+              <a:t>k to </a:t>
+            </a:r>
+            <a:r>
+              <a:rPr b="0" lang="en-US" sz="4400" spc="-1" strike="noStrike">
+                <a:solidFill>
+                  <a:srgbClr val="000000"/>
+                </a:solidFill>
+                <a:latin typeface="Arial"/>
+              </a:rPr>
+              <a:t>edit </a:t>
+            </a:r>
+            <a:r>
+              <a:rPr b="0" lang="en-US" sz="4400" spc="-1" strike="noStrike">
+                <a:solidFill>
+                  <a:srgbClr val="000000"/>
+                </a:solidFill>
+                <a:latin typeface="Arial"/>
+              </a:rPr>
+              <a:t>the </a:t>
+            </a:r>
+            <a:r>
+              <a:rPr b="0" lang="en-US" sz="4400" spc="-1" strike="noStrike">
+                <a:solidFill>
+                  <a:srgbClr val="000000"/>
+                </a:solidFill>
+                <a:latin typeface="Arial"/>
+              </a:rPr>
+              <a:t>title </a:t>
+            </a:r>
+            <a:r>
+              <a:rPr b="0" lang="en-US" sz="4400" spc="-1" strike="noStrike">
+                <a:solidFill>
+                  <a:srgbClr val="000000"/>
+                </a:solidFill>
+                <a:latin typeface="Arial"/>
+              </a:rPr>
+              <a:t>text </a:t>
+            </a:r>
+            <a:r>
+              <a:rPr b="0" lang="en-US" sz="4400" spc="-1" strike="noStrike">
+                <a:solidFill>
+                  <a:srgbClr val="000000"/>
+                </a:solidFill>
+                <a:latin typeface="Arial"/>
+              </a:rPr>
+              <a:t>for</a:t>
+            </a:r>
+            <a:r>
+              <a:rPr b="0" lang="en-US" sz="4400" spc="-1" strike="noStrike">
+                <a:solidFill>
+                  <a:srgbClr val="000000"/>
+                </a:solidFill>
+                <a:latin typeface="Arial"/>
+              </a:rPr>
+              <a:t>mat</a:t>
             </a:r>
             <a:endParaRPr b="0" lang="en-US" sz="4400" spc="-1" strike="noStrike">
               <a:solidFill>
@@ -3266,7 +3329,7 @@
                 <a:tab algn="l" pos="0"/>
               </a:tabLst>
             </a:pPr>
-            <a:fld id="{02A36D8E-45A1-47AE-9150-383461BBF342}" type="slidenum">
+            <a:fld id="{3854AD86-852B-4866-A597-A0290A301EF9}" type="slidenum">
               <a:rPr b="0" lang="de-DE" sz="1100" spc="-1" strike="noStrike">
                 <a:solidFill>
                   <a:srgbClr val="1d3c91"/>
@@ -3382,7 +3445,70 @@
                 </a:solidFill>
                 <a:latin typeface="Arial"/>
               </a:rPr>
-              <a:t>Click to edit the title text format</a:t>
+              <a:t>Clic</a:t>
+            </a:r>
+            <a:r>
+              <a:rPr b="0" lang="en-US" sz="4400" spc="-1" strike="noStrike">
+                <a:solidFill>
+                  <a:srgbClr val="000000"/>
+                </a:solidFill>
+                <a:latin typeface="Arial"/>
+              </a:rPr>
+              <a:t>k to </a:t>
+            </a:r>
+            <a:r>
+              <a:rPr b="0" lang="en-US" sz="4400" spc="-1" strike="noStrike">
+                <a:solidFill>
+                  <a:srgbClr val="000000"/>
+                </a:solidFill>
+                <a:latin typeface="Arial"/>
+              </a:rPr>
+              <a:t>edit </a:t>
+            </a:r>
+            <a:r>
+              <a:rPr b="0" lang="en-US" sz="4400" spc="-1" strike="noStrike">
+                <a:solidFill>
+                  <a:srgbClr val="000000"/>
+                </a:solidFill>
+                <a:latin typeface="Arial"/>
+              </a:rPr>
+              <a:t>the </a:t>
+            </a:r>
+            <a:r>
+              <a:rPr b="0" lang="en-US" sz="4400" spc="-1" strike="noStrike">
+                <a:solidFill>
+                  <a:srgbClr val="000000"/>
+                </a:solidFill>
+                <a:latin typeface="Arial"/>
+              </a:rPr>
+              <a:t>title </a:t>
+            </a:r>
+            <a:r>
+              <a:rPr b="0" lang="en-US" sz="4400" spc="-1" strike="noStrike">
+                <a:solidFill>
+                  <a:srgbClr val="000000"/>
+                </a:solidFill>
+                <a:latin typeface="Arial"/>
+              </a:rPr>
+              <a:t>text </a:t>
+            </a:r>
+            <a:r>
+              <a:rPr b="0" lang="en-US" sz="4400" spc="-1" strike="noStrike">
+                <a:solidFill>
+                  <a:srgbClr val="000000"/>
+                </a:solidFill>
+                <a:latin typeface="Arial"/>
+              </a:rPr>
+              <a:t>for</a:t>
+            </a:r>
+            <a:r>
+              <a:rPr b="0" lang="en-US" sz="4400" spc="-1" strike="noStrike">
+                <a:solidFill>
+                  <a:srgbClr val="000000"/>
+                </a:solidFill>
+                <a:latin typeface="Arial"/>
+              </a:rPr>
+              <a:t>mat</a:t>
             </a:r>
             <a:endParaRPr b="0" lang="en-US" sz="4400" spc="-1" strike="noStrike">
               <a:solidFill>
@@ -8559,21 +8685,21 @@
           <p:nvPr/>
         </p:nvGraphicFramePr>
         <p:xfrm>
-          <a:off x="1181160" y="1399320"/>
-          <a:ext cx="9829440" cy="2370600"/>
+          <a:off x="898560" y="1427400"/>
+          <a:ext cx="10531440" cy="4322160"/>
         </p:xfrm>
         <a:graphic>
           <a:graphicData uri="http://schemas.openxmlformats.org/drawingml/2006/table">
             <a:tbl>
               <a:tblPr/>
               <a:tblGrid>
-                <a:gridCol w="1965240"/>
-                <a:gridCol w="1965240"/>
-                <a:gridCol w="1965240"/>
-                <a:gridCol w="1965240"/>
-                <a:gridCol w="1968840"/>
+                <a:gridCol w="1983600"/>
+                <a:gridCol w="1983600"/>
+                <a:gridCol w="1983600"/>
+                <a:gridCol w="1983600"/>
+                <a:gridCol w="2777760"/>
               </a:tblGrid>
-              <a:tr h="364680">
+              <a:tr h="343440">
                 <a:tc>
                   <a:txBody>
                     <a:bodyPr lIns="36000" rIns="36000" tIns="36000" bIns="36000" anchor="t">
@@ -9959,7 +10085,7 @@
                           </a:solidFill>
                           <a:latin typeface="Arial"/>
                         </a:rPr>
-                        <a:t>MPI_request_get_status</a:t>
+                        <a:t>MPI_Request_get_status</a:t>
                       </a:r>
                       <a:endParaRPr b="0" lang="en-US" sz="1800" spc="-1" strike="noStrike">
                         <a:solidFill>

</xml_diff>

<commit_message>
remove plotting shell script
</commit_message>
<xml_diff>
--- a/presentation/presentation-partitioned-progress.pptx
+++ b/presentation/presentation-partitioned-progress.pptx
@@ -27,6 +27,7 @@
     <p:sldId id="270" r:id="rId20"/>
     <p:sldId id="271" r:id="rId21"/>
     <p:sldId id="272" r:id="rId22"/>
+    <p:sldId id="273" r:id="rId23"/>
   </p:sldIdLst>
   <p:sldSz cx="12192000" cy="6858000"/>
   <p:notesSz cx="7559675" cy="10691813"/>
@@ -86,7 +87,34 @@
                 </a:solidFill>
                 <a:latin typeface="Arial"/>
               </a:rPr>
-              <a:t>Click to move the slide</a:t>
+              <a:t>Click to </a:t>
+            </a:r>
+            <a:r>
+              <a:rPr b="0" lang="en-US" sz="4400" spc="-1" strike="noStrike">
+                <a:solidFill>
+                  <a:srgbClr val="000000"/>
+                </a:solidFill>
+                <a:latin typeface="Arial"/>
+              </a:rPr>
+              <a:t>move </a:t>
+            </a:r>
+            <a:r>
+              <a:rPr b="0" lang="en-US" sz="4400" spc="-1" strike="noStrike">
+                <a:solidFill>
+                  <a:srgbClr val="000000"/>
+                </a:solidFill>
+                <a:latin typeface="Arial"/>
+              </a:rPr>
+              <a:t>the </a:t>
+            </a:r>
+            <a:r>
+              <a:rPr b="0" lang="en-US" sz="4400" spc="-1" strike="noStrike">
+                <a:solidFill>
+                  <a:srgbClr val="000000"/>
+                </a:solidFill>
+                <a:latin typeface="Arial"/>
+              </a:rPr>
+              <a:t>slide</a:t>
             </a:r>
             <a:endParaRPr b="0" lang="en-US" sz="4400" spc="-1" strike="noStrike">
               <a:solidFill>
@@ -135,7 +163,16 @@
                 </a:solidFill>
                 <a:latin typeface="Arial"/>
               </a:rPr>
-              <a:t>Click to edit the notes format</a:t>
+              <a:t>Click to edit the </a:t>
+            </a:r>
+            <a:r>
+              <a:rPr b="0" lang="en-US" sz="2000" spc="-1" strike="noStrike">
+                <a:solidFill>
+                  <a:srgbClr val="000000"/>
+                </a:solidFill>
+                <a:latin typeface="Arial"/>
+              </a:rPr>
+              <a:t>notes format</a:t>
             </a:r>
             <a:endParaRPr b="0" lang="en-US" sz="2000" spc="-1" strike="noStrike">
               <a:solidFill>
@@ -357,7 +394,7 @@
             <a:pPr indent="0" algn="r">
               <a:buNone/>
             </a:pPr>
-            <a:fld id="{F19437E9-740A-48E0-A501-D0C0CF7E2C8E}" type="slidenum">
+            <a:fld id="{7869320E-CC39-412E-AEDE-D18BF98B0912}" type="slidenum">
               <a:rPr b="0" lang="en-US" sz="1400" spc="-1" strike="noStrike">
                 <a:solidFill>
                   <a:srgbClr val="000000"/>
@@ -400,7 +437,7 @@
       </p:grpSpPr>
       <p:sp>
         <p:nvSpPr>
-          <p:cNvPr id="82" name="PlaceHolder 1"/>
+          <p:cNvPr id="78" name="PlaceHolder 1"/>
           <p:cNvSpPr>
             <a:spLocks noGrp="1"/>
           </p:cNvSpPr>
@@ -423,7 +460,7 @@
       </p:sp>
       <p:sp>
         <p:nvSpPr>
-          <p:cNvPr id="83" name="PlaceHolder 2"/>
+          <p:cNvPr id="79" name="PlaceHolder 2"/>
           <p:cNvSpPr>
             <a:spLocks noGrp="1"/>
           </p:cNvSpPr>
@@ -434,7 +471,7 @@
         <p:spPr>
           <a:xfrm>
             <a:off x="685800" y="4400640"/>
-            <a:ext cx="5485680" cy="3599640"/>
+            <a:ext cx="5485320" cy="3599280"/>
           </a:xfrm>
           <a:prstGeom prst="rect">
             <a:avLst/>
@@ -463,18 +500,18 @@
       </p:sp>
       <p:sp>
         <p:nvSpPr>
-          <p:cNvPr id="84" name="PlaceHolder 3"/>
+          <p:cNvPr id="80" name="PlaceHolder 3"/>
           <p:cNvSpPr>
             <a:spLocks noGrp="1"/>
           </p:cNvSpPr>
           <p:nvPr>
-            <p:ph type="sldNum" idx="18"/>
+            <p:ph type="sldNum" idx="11"/>
           </p:nvPr>
         </p:nvSpPr>
         <p:spPr>
           <a:xfrm>
             <a:off x="3884760" y="8685360"/>
-            <a:ext cx="2971080" cy="457920"/>
+            <a:ext cx="2970720" cy="457560"/>
           </a:xfrm>
           <a:prstGeom prst="rect">
             <a:avLst/>
@@ -525,7 +562,7 @@
       </p:grpSpPr>
       <p:sp>
         <p:nvSpPr>
-          <p:cNvPr id="109" name="PlaceHolder 1"/>
+          <p:cNvPr id="105" name="PlaceHolder 1"/>
           <p:cNvSpPr>
             <a:spLocks noGrp="1"/>
           </p:cNvSpPr>
@@ -548,7 +585,7 @@
       </p:sp>
       <p:sp>
         <p:nvSpPr>
-          <p:cNvPr id="110" name="PlaceHolder 2"/>
+          <p:cNvPr id="106" name="PlaceHolder 2"/>
           <p:cNvSpPr>
             <a:spLocks noGrp="1"/>
           </p:cNvSpPr>
@@ -559,7 +596,7 @@
         <p:spPr>
           <a:xfrm>
             <a:off x="685800" y="4400640"/>
-            <a:ext cx="5485680" cy="3599640"/>
+            <a:ext cx="5485320" cy="3599280"/>
           </a:xfrm>
           <a:prstGeom prst="rect">
             <a:avLst/>
@@ -588,18 +625,18 @@
       </p:sp>
       <p:sp>
         <p:nvSpPr>
-          <p:cNvPr id="111" name="PlaceHolder 3"/>
+          <p:cNvPr id="107" name="PlaceHolder 3"/>
           <p:cNvSpPr>
             <a:spLocks noGrp="1"/>
           </p:cNvSpPr>
           <p:nvPr>
-            <p:ph type="sldNum" idx="27"/>
+            <p:ph type="sldNum" idx="20"/>
           </p:nvPr>
         </p:nvSpPr>
         <p:spPr>
           <a:xfrm>
             <a:off x="3884760" y="8685360"/>
-            <a:ext cx="2971080" cy="457920"/>
+            <a:ext cx="2970720" cy="457560"/>
           </a:xfrm>
           <a:prstGeom prst="rect">
             <a:avLst/>
@@ -650,7 +687,7 @@
       </p:grpSpPr>
       <p:sp>
         <p:nvSpPr>
-          <p:cNvPr id="112" name="PlaceHolder 1"/>
+          <p:cNvPr id="108" name="PlaceHolder 1"/>
           <p:cNvSpPr>
             <a:spLocks noGrp="1"/>
           </p:cNvSpPr>
@@ -673,7 +710,7 @@
       </p:sp>
       <p:sp>
         <p:nvSpPr>
-          <p:cNvPr id="113" name="PlaceHolder 2"/>
+          <p:cNvPr id="109" name="PlaceHolder 2"/>
           <p:cNvSpPr>
             <a:spLocks noGrp="1"/>
           </p:cNvSpPr>
@@ -684,7 +721,7 @@
         <p:spPr>
           <a:xfrm>
             <a:off x="685800" y="4400640"/>
-            <a:ext cx="5485680" cy="3599640"/>
+            <a:ext cx="5485320" cy="3599280"/>
           </a:xfrm>
           <a:prstGeom prst="rect">
             <a:avLst/>
@@ -713,18 +750,18 @@
       </p:sp>
       <p:sp>
         <p:nvSpPr>
-          <p:cNvPr id="114" name="PlaceHolder 3"/>
+          <p:cNvPr id="110" name="PlaceHolder 3"/>
           <p:cNvSpPr>
             <a:spLocks noGrp="1"/>
           </p:cNvSpPr>
           <p:nvPr>
-            <p:ph type="sldNum" idx="28"/>
+            <p:ph type="sldNum" idx="21"/>
           </p:nvPr>
         </p:nvSpPr>
         <p:spPr>
           <a:xfrm>
             <a:off x="3884760" y="8685360"/>
-            <a:ext cx="2971080" cy="457920"/>
+            <a:ext cx="2970720" cy="457560"/>
           </a:xfrm>
           <a:prstGeom prst="rect">
             <a:avLst/>
@@ -775,7 +812,7 @@
       </p:grpSpPr>
       <p:sp>
         <p:nvSpPr>
-          <p:cNvPr id="115" name="PlaceHolder 1"/>
+          <p:cNvPr id="111" name="PlaceHolder 1"/>
           <p:cNvSpPr>
             <a:spLocks noGrp="1"/>
           </p:cNvSpPr>
@@ -798,7 +835,7 @@
       </p:sp>
       <p:sp>
         <p:nvSpPr>
-          <p:cNvPr id="116" name="PlaceHolder 2"/>
+          <p:cNvPr id="112" name="PlaceHolder 2"/>
           <p:cNvSpPr>
             <a:spLocks noGrp="1"/>
           </p:cNvSpPr>
@@ -809,7 +846,7 @@
         <p:spPr>
           <a:xfrm>
             <a:off x="685800" y="4400640"/>
-            <a:ext cx="5485680" cy="3599640"/>
+            <a:ext cx="5485320" cy="3599280"/>
           </a:xfrm>
           <a:prstGeom prst="rect">
             <a:avLst/>
@@ -838,18 +875,18 @@
       </p:sp>
       <p:sp>
         <p:nvSpPr>
-          <p:cNvPr id="117" name="PlaceHolder 3"/>
+          <p:cNvPr id="113" name="PlaceHolder 3"/>
           <p:cNvSpPr>
             <a:spLocks noGrp="1"/>
           </p:cNvSpPr>
           <p:nvPr>
-            <p:ph type="sldNum" idx="29"/>
+            <p:ph type="sldNum" idx="22"/>
           </p:nvPr>
         </p:nvSpPr>
         <p:spPr>
           <a:xfrm>
             <a:off x="3884760" y="8685360"/>
-            <a:ext cx="2971080" cy="457920"/>
+            <a:ext cx="2970720" cy="457560"/>
           </a:xfrm>
           <a:prstGeom prst="rect">
             <a:avLst/>
@@ -900,7 +937,7 @@
       </p:grpSpPr>
       <p:sp>
         <p:nvSpPr>
-          <p:cNvPr id="118" name="PlaceHolder 1"/>
+          <p:cNvPr id="114" name="PlaceHolder 1"/>
           <p:cNvSpPr>
             <a:spLocks noGrp="1"/>
           </p:cNvSpPr>
@@ -923,7 +960,7 @@
       </p:sp>
       <p:sp>
         <p:nvSpPr>
-          <p:cNvPr id="119" name="PlaceHolder 2"/>
+          <p:cNvPr id="115" name="PlaceHolder 2"/>
           <p:cNvSpPr>
             <a:spLocks noGrp="1"/>
           </p:cNvSpPr>
@@ -934,7 +971,7 @@
         <p:spPr>
           <a:xfrm>
             <a:off x="685800" y="4400640"/>
-            <a:ext cx="5485680" cy="3599640"/>
+            <a:ext cx="5485320" cy="3599280"/>
           </a:xfrm>
           <a:prstGeom prst="rect">
             <a:avLst/>
@@ -963,18 +1000,18 @@
       </p:sp>
       <p:sp>
         <p:nvSpPr>
-          <p:cNvPr id="120" name="PlaceHolder 3"/>
+          <p:cNvPr id="116" name="PlaceHolder 3"/>
           <p:cNvSpPr>
             <a:spLocks noGrp="1"/>
           </p:cNvSpPr>
           <p:nvPr>
-            <p:ph type="sldNum" idx="30"/>
+            <p:ph type="sldNum" idx="23"/>
           </p:nvPr>
         </p:nvSpPr>
         <p:spPr>
           <a:xfrm>
             <a:off x="3884760" y="8685360"/>
-            <a:ext cx="2971080" cy="457920"/>
+            <a:ext cx="2970720" cy="457560"/>
           </a:xfrm>
           <a:prstGeom prst="rect">
             <a:avLst/>
@@ -1025,7 +1062,7 @@
       </p:grpSpPr>
       <p:sp>
         <p:nvSpPr>
-          <p:cNvPr id="121" name="PlaceHolder 1"/>
+          <p:cNvPr id="117" name="PlaceHolder 1"/>
           <p:cNvSpPr>
             <a:spLocks noGrp="1"/>
           </p:cNvSpPr>
@@ -1048,7 +1085,7 @@
       </p:sp>
       <p:sp>
         <p:nvSpPr>
-          <p:cNvPr id="122" name="PlaceHolder 2"/>
+          <p:cNvPr id="118" name="PlaceHolder 2"/>
           <p:cNvSpPr>
             <a:spLocks noGrp="1"/>
           </p:cNvSpPr>
@@ -1059,7 +1096,7 @@
         <p:spPr>
           <a:xfrm>
             <a:off x="685800" y="4400640"/>
-            <a:ext cx="5485680" cy="3599640"/>
+            <a:ext cx="5485320" cy="3599280"/>
           </a:xfrm>
           <a:prstGeom prst="rect">
             <a:avLst/>
@@ -1088,18 +1125,18 @@
       </p:sp>
       <p:sp>
         <p:nvSpPr>
-          <p:cNvPr id="123" name="PlaceHolder 3"/>
+          <p:cNvPr id="119" name="PlaceHolder 3"/>
           <p:cNvSpPr>
             <a:spLocks noGrp="1"/>
           </p:cNvSpPr>
           <p:nvPr>
-            <p:ph type="sldNum" idx="31"/>
+            <p:ph type="sldNum" idx="24"/>
           </p:nvPr>
         </p:nvSpPr>
         <p:spPr>
           <a:xfrm>
             <a:off x="3884760" y="8685360"/>
-            <a:ext cx="2971080" cy="457920"/>
+            <a:ext cx="2970720" cy="457560"/>
           </a:xfrm>
           <a:prstGeom prst="rect">
             <a:avLst/>
@@ -1150,7 +1187,7 @@
       </p:grpSpPr>
       <p:sp>
         <p:nvSpPr>
-          <p:cNvPr id="124" name="PlaceHolder 1"/>
+          <p:cNvPr id="120" name="PlaceHolder 1"/>
           <p:cNvSpPr>
             <a:spLocks noGrp="1"/>
           </p:cNvSpPr>
@@ -1173,7 +1210,7 @@
       </p:sp>
       <p:sp>
         <p:nvSpPr>
-          <p:cNvPr id="125" name="PlaceHolder 2"/>
+          <p:cNvPr id="121" name="PlaceHolder 2"/>
           <p:cNvSpPr>
             <a:spLocks noGrp="1"/>
           </p:cNvSpPr>
@@ -1184,7 +1221,7 @@
         <p:spPr>
           <a:xfrm>
             <a:off x="685800" y="4400640"/>
-            <a:ext cx="5485680" cy="3599640"/>
+            <a:ext cx="5485320" cy="3599280"/>
           </a:xfrm>
           <a:prstGeom prst="rect">
             <a:avLst/>
@@ -1213,18 +1250,18 @@
       </p:sp>
       <p:sp>
         <p:nvSpPr>
-          <p:cNvPr id="126" name="PlaceHolder 3"/>
+          <p:cNvPr id="122" name="PlaceHolder 3"/>
           <p:cNvSpPr>
             <a:spLocks noGrp="1"/>
           </p:cNvSpPr>
           <p:nvPr>
-            <p:ph type="sldNum" idx="32"/>
+            <p:ph type="sldNum" idx="25"/>
           </p:nvPr>
         </p:nvSpPr>
         <p:spPr>
           <a:xfrm>
             <a:off x="3884760" y="8685360"/>
-            <a:ext cx="2971080" cy="457920"/>
+            <a:ext cx="2970720" cy="457560"/>
           </a:xfrm>
           <a:prstGeom prst="rect">
             <a:avLst/>
@@ -1275,7 +1312,7 @@
       </p:grpSpPr>
       <p:sp>
         <p:nvSpPr>
-          <p:cNvPr id="127" name="PlaceHolder 1"/>
+          <p:cNvPr id="123" name="PlaceHolder 1"/>
           <p:cNvSpPr>
             <a:spLocks noGrp="1"/>
           </p:cNvSpPr>
@@ -1298,7 +1335,7 @@
       </p:sp>
       <p:sp>
         <p:nvSpPr>
-          <p:cNvPr id="128" name="PlaceHolder 2"/>
+          <p:cNvPr id="124" name="PlaceHolder 2"/>
           <p:cNvSpPr>
             <a:spLocks noGrp="1"/>
           </p:cNvSpPr>
@@ -1309,7 +1346,7 @@
         <p:spPr>
           <a:xfrm>
             <a:off x="685800" y="4400640"/>
-            <a:ext cx="5485680" cy="3599640"/>
+            <a:ext cx="5485320" cy="3599280"/>
           </a:xfrm>
           <a:prstGeom prst="rect">
             <a:avLst/>
@@ -1338,18 +1375,18 @@
       </p:sp>
       <p:sp>
         <p:nvSpPr>
-          <p:cNvPr id="129" name="PlaceHolder 3"/>
+          <p:cNvPr id="125" name="PlaceHolder 3"/>
           <p:cNvSpPr>
             <a:spLocks noGrp="1"/>
           </p:cNvSpPr>
           <p:nvPr>
-            <p:ph type="sldNum" idx="33"/>
+            <p:ph type="sldNum" idx="26"/>
           </p:nvPr>
         </p:nvSpPr>
         <p:spPr>
           <a:xfrm>
             <a:off x="3884760" y="8685360"/>
-            <a:ext cx="2971080" cy="457920"/>
+            <a:ext cx="2970720" cy="457560"/>
           </a:xfrm>
           <a:prstGeom prst="rect">
             <a:avLst/>
@@ -1400,7 +1437,7 @@
       </p:grpSpPr>
       <p:sp>
         <p:nvSpPr>
-          <p:cNvPr id="130" name="PlaceHolder 1"/>
+          <p:cNvPr id="126" name="PlaceHolder 1"/>
           <p:cNvSpPr>
             <a:spLocks noGrp="1"/>
           </p:cNvSpPr>
@@ -1423,7 +1460,7 @@
       </p:sp>
       <p:sp>
         <p:nvSpPr>
-          <p:cNvPr id="131" name="PlaceHolder 2"/>
+          <p:cNvPr id="127" name="PlaceHolder 2"/>
           <p:cNvSpPr>
             <a:spLocks noGrp="1"/>
           </p:cNvSpPr>
@@ -1434,7 +1471,7 @@
         <p:spPr>
           <a:xfrm>
             <a:off x="685800" y="4400640"/>
-            <a:ext cx="5485680" cy="3599640"/>
+            <a:ext cx="5485320" cy="3599280"/>
           </a:xfrm>
           <a:prstGeom prst="rect">
             <a:avLst/>
@@ -1463,18 +1500,143 @@
       </p:sp>
       <p:sp>
         <p:nvSpPr>
-          <p:cNvPr id="132" name="PlaceHolder 3"/>
+          <p:cNvPr id="128" name="PlaceHolder 3"/>
           <p:cNvSpPr>
             <a:spLocks noGrp="1"/>
           </p:cNvSpPr>
           <p:nvPr>
-            <p:ph type="sldNum" idx="34"/>
+            <p:ph type="sldNum" idx="27"/>
           </p:nvPr>
         </p:nvSpPr>
         <p:spPr>
           <a:xfrm>
             <a:off x="3884760" y="8685360"/>
-            <a:ext cx="2971080" cy="457920"/>
+            <a:ext cx="2970720" cy="457560"/>
+          </a:xfrm>
+          <a:prstGeom prst="rect">
+            <a:avLst/>
+          </a:prstGeom>
+          <a:noFill/>
+          <a:ln w="0">
+            <a:noFill/>
+          </a:ln>
+        </p:spPr>
+        <p:txBody>
+          <a:bodyPr lIns="91440" rIns="91440" tIns="45720" bIns="45720" anchor="b">
+            <a:noAutofit/>
+          </a:bodyPr>
+          <a:p>
+            <a:pPr indent="0">
+              <a:buNone/>
+            </a:pPr>
+            <a:endParaRPr b="0" lang="en-US" sz="1400" spc="-1" strike="noStrike">
+              <a:solidFill>
+                <a:srgbClr val="000000"/>
+              </a:solidFill>
+              <a:latin typeface="Times New Roman"/>
+            </a:endParaRPr>
+          </a:p>
+        </p:txBody>
+      </p:sp>
+    </p:spTree>
+  </p:cSld>
+</p:notes>
+</file>
+
+<file path=ppt/notesSlides/notesSlide18.xml><?xml version="1.0" encoding="utf-8"?>
+<p:notes xmlns:a="http://schemas.openxmlformats.org/drawingml/2006/main" xmlns:p="http://schemas.openxmlformats.org/presentationml/2006/main" xmlns:r="http://schemas.openxmlformats.org/officeDocument/2006/relationships" xmlns:p14="http://schemas.microsoft.com/office/powerpoint/2010/main" xmlns:p15="http://schemas.microsoft.com/office/powerpoint/2012/main" xmlns:mc="http://schemas.openxmlformats.org/markup-compatibility/2006">
+  <p:cSld>
+    <p:spTree>
+      <p:nvGrpSpPr>
+        <p:cNvPr id="1" name=""/>
+        <p:cNvGrpSpPr/>
+        <p:nvPr/>
+      </p:nvGrpSpPr>
+      <p:grpSpPr>
+        <a:xfrm>
+          <a:off x="0" y="0"/>
+          <a:ext cx="0" cy="0"/>
+          <a:chOff x="0" y="0"/>
+          <a:chExt cx="0" cy="0"/>
+        </a:xfrm>
+      </p:grpSpPr>
+      <p:sp>
+        <p:nvSpPr>
+          <p:cNvPr id="129" name="PlaceHolder 1"/>
+          <p:cNvSpPr>
+            <a:spLocks noGrp="1"/>
+          </p:cNvSpPr>
+          <p:nvPr>
+            <p:ph type="sldImg"/>
+          </p:nvPr>
+        </p:nvSpPr>
+        <p:spPr>
+          <a:xfrm>
+            <a:off x="0" y="0"/>
+            <a:ext cx="0" cy="0"/>
+          </a:xfrm>
+          <a:prstGeom prst="rect">
+            <a:avLst/>
+          </a:prstGeom>
+          <a:ln w="0">
+            <a:noFill/>
+          </a:ln>
+        </p:spPr>
+      </p:sp>
+      <p:sp>
+        <p:nvSpPr>
+          <p:cNvPr id="130" name="PlaceHolder 2"/>
+          <p:cNvSpPr>
+            <a:spLocks noGrp="1"/>
+          </p:cNvSpPr>
+          <p:nvPr>
+            <p:ph type="body"/>
+          </p:nvPr>
+        </p:nvSpPr>
+        <p:spPr>
+          <a:xfrm>
+            <a:off x="685800" y="4400640"/>
+            <a:ext cx="5485320" cy="3599280"/>
+          </a:xfrm>
+          <a:prstGeom prst="rect">
+            <a:avLst/>
+          </a:prstGeom>
+          <a:noFill/>
+          <a:ln w="0">
+            <a:noFill/>
+          </a:ln>
+        </p:spPr>
+        <p:txBody>
+          <a:bodyPr lIns="91440" rIns="91440" tIns="45720" bIns="45720" anchor="ctr">
+            <a:noAutofit/>
+          </a:bodyPr>
+          <a:p>
+            <a:pPr marL="216000" indent="-216000">
+              <a:buNone/>
+            </a:pPr>
+            <a:endParaRPr b="0" lang="en-US" sz="1800" spc="-1" strike="noStrike">
+              <a:solidFill>
+                <a:srgbClr val="000000"/>
+              </a:solidFill>
+              <a:latin typeface="Arial"/>
+            </a:endParaRPr>
+          </a:p>
+        </p:txBody>
+      </p:sp>
+      <p:sp>
+        <p:nvSpPr>
+          <p:cNvPr id="131" name="PlaceHolder 3"/>
+          <p:cNvSpPr>
+            <a:spLocks noGrp="1"/>
+          </p:cNvSpPr>
+          <p:nvPr>
+            <p:ph type="sldNum" idx="28"/>
+          </p:nvPr>
+        </p:nvSpPr>
+        <p:spPr>
+          <a:xfrm>
+            <a:off x="3884760" y="8685360"/>
+            <a:ext cx="2970720" cy="457560"/>
           </a:xfrm>
           <a:prstGeom prst="rect">
             <a:avLst/>
@@ -1525,7 +1687,7 @@
       </p:grpSpPr>
       <p:sp>
         <p:nvSpPr>
-          <p:cNvPr id="85" name="PlaceHolder 1"/>
+          <p:cNvPr id="81" name="PlaceHolder 1"/>
           <p:cNvSpPr>
             <a:spLocks noGrp="1"/>
           </p:cNvSpPr>
@@ -1548,7 +1710,7 @@
       </p:sp>
       <p:sp>
         <p:nvSpPr>
-          <p:cNvPr id="86" name="PlaceHolder 2"/>
+          <p:cNvPr id="82" name="PlaceHolder 2"/>
           <p:cNvSpPr>
             <a:spLocks noGrp="1"/>
           </p:cNvSpPr>
@@ -1559,7 +1721,7 @@
         <p:spPr>
           <a:xfrm>
             <a:off x="685800" y="4400640"/>
-            <a:ext cx="5485680" cy="3599640"/>
+            <a:ext cx="5485320" cy="3599280"/>
           </a:xfrm>
           <a:prstGeom prst="rect">
             <a:avLst/>
@@ -1588,18 +1750,18 @@
       </p:sp>
       <p:sp>
         <p:nvSpPr>
-          <p:cNvPr id="87" name="PlaceHolder 3"/>
+          <p:cNvPr id="83" name="PlaceHolder 3"/>
           <p:cNvSpPr>
             <a:spLocks noGrp="1"/>
           </p:cNvSpPr>
           <p:nvPr>
-            <p:ph type="sldNum" idx="19"/>
+            <p:ph type="sldNum" idx="12"/>
           </p:nvPr>
         </p:nvSpPr>
         <p:spPr>
           <a:xfrm>
             <a:off x="3884760" y="8685360"/>
-            <a:ext cx="2971080" cy="457920"/>
+            <a:ext cx="2970720" cy="457560"/>
           </a:xfrm>
           <a:prstGeom prst="rect">
             <a:avLst/>
@@ -1650,7 +1812,7 @@
       </p:grpSpPr>
       <p:sp>
         <p:nvSpPr>
-          <p:cNvPr id="88" name="PlaceHolder 1"/>
+          <p:cNvPr id="84" name="PlaceHolder 1"/>
           <p:cNvSpPr>
             <a:spLocks noGrp="1"/>
           </p:cNvSpPr>
@@ -1673,7 +1835,7 @@
       </p:sp>
       <p:sp>
         <p:nvSpPr>
-          <p:cNvPr id="89" name="PlaceHolder 2"/>
+          <p:cNvPr id="85" name="PlaceHolder 2"/>
           <p:cNvSpPr>
             <a:spLocks noGrp="1"/>
           </p:cNvSpPr>
@@ -1684,7 +1846,7 @@
         <p:spPr>
           <a:xfrm>
             <a:off x="685800" y="4400640"/>
-            <a:ext cx="5485680" cy="3599640"/>
+            <a:ext cx="5485320" cy="3599280"/>
           </a:xfrm>
           <a:prstGeom prst="rect">
             <a:avLst/>
@@ -1713,18 +1875,18 @@
       </p:sp>
       <p:sp>
         <p:nvSpPr>
-          <p:cNvPr id="90" name="PlaceHolder 3"/>
+          <p:cNvPr id="86" name="PlaceHolder 3"/>
           <p:cNvSpPr>
             <a:spLocks noGrp="1"/>
           </p:cNvSpPr>
           <p:nvPr>
-            <p:ph type="sldNum" idx="20"/>
+            <p:ph type="sldNum" idx="13"/>
           </p:nvPr>
         </p:nvSpPr>
         <p:spPr>
           <a:xfrm>
             <a:off x="3884760" y="8685360"/>
-            <a:ext cx="2971080" cy="457920"/>
+            <a:ext cx="2970720" cy="457560"/>
           </a:xfrm>
           <a:prstGeom prst="rect">
             <a:avLst/>
@@ -1775,7 +1937,7 @@
       </p:grpSpPr>
       <p:sp>
         <p:nvSpPr>
-          <p:cNvPr id="91" name="PlaceHolder 1"/>
+          <p:cNvPr id="87" name="PlaceHolder 1"/>
           <p:cNvSpPr>
             <a:spLocks noGrp="1"/>
           </p:cNvSpPr>
@@ -1798,7 +1960,7 @@
       </p:sp>
       <p:sp>
         <p:nvSpPr>
-          <p:cNvPr id="92" name="PlaceHolder 2"/>
+          <p:cNvPr id="88" name="PlaceHolder 2"/>
           <p:cNvSpPr>
             <a:spLocks noGrp="1"/>
           </p:cNvSpPr>
@@ -1809,7 +1971,7 @@
         <p:spPr>
           <a:xfrm>
             <a:off x="685800" y="4400640"/>
-            <a:ext cx="5485680" cy="3599640"/>
+            <a:ext cx="5485320" cy="3599280"/>
           </a:xfrm>
           <a:prstGeom prst="rect">
             <a:avLst/>
@@ -1838,18 +2000,18 @@
       </p:sp>
       <p:sp>
         <p:nvSpPr>
-          <p:cNvPr id="93" name="PlaceHolder 3"/>
+          <p:cNvPr id="89" name="PlaceHolder 3"/>
           <p:cNvSpPr>
             <a:spLocks noGrp="1"/>
           </p:cNvSpPr>
           <p:nvPr>
-            <p:ph type="sldNum" idx="21"/>
+            <p:ph type="sldNum" idx="14"/>
           </p:nvPr>
         </p:nvSpPr>
         <p:spPr>
           <a:xfrm>
             <a:off x="3884760" y="8685360"/>
-            <a:ext cx="2971080" cy="457920"/>
+            <a:ext cx="2970720" cy="457560"/>
           </a:xfrm>
           <a:prstGeom prst="rect">
             <a:avLst/>
@@ -1900,7 +2062,7 @@
       </p:grpSpPr>
       <p:sp>
         <p:nvSpPr>
-          <p:cNvPr id="94" name="PlaceHolder 1"/>
+          <p:cNvPr id="90" name="PlaceHolder 1"/>
           <p:cNvSpPr>
             <a:spLocks noGrp="1"/>
           </p:cNvSpPr>
@@ -1923,7 +2085,7 @@
       </p:sp>
       <p:sp>
         <p:nvSpPr>
-          <p:cNvPr id="95" name="PlaceHolder 2"/>
+          <p:cNvPr id="91" name="PlaceHolder 2"/>
           <p:cNvSpPr>
             <a:spLocks noGrp="1"/>
           </p:cNvSpPr>
@@ -1934,7 +2096,7 @@
         <p:spPr>
           <a:xfrm>
             <a:off x="685800" y="4400640"/>
-            <a:ext cx="5485680" cy="3599640"/>
+            <a:ext cx="5485320" cy="3599280"/>
           </a:xfrm>
           <a:prstGeom prst="rect">
             <a:avLst/>
@@ -1963,18 +2125,18 @@
       </p:sp>
       <p:sp>
         <p:nvSpPr>
-          <p:cNvPr id="96" name="PlaceHolder 3"/>
+          <p:cNvPr id="92" name="PlaceHolder 3"/>
           <p:cNvSpPr>
             <a:spLocks noGrp="1"/>
           </p:cNvSpPr>
           <p:nvPr>
-            <p:ph type="sldNum" idx="22"/>
+            <p:ph type="sldNum" idx="15"/>
           </p:nvPr>
         </p:nvSpPr>
         <p:spPr>
           <a:xfrm>
             <a:off x="3884760" y="8685360"/>
-            <a:ext cx="2971080" cy="457920"/>
+            <a:ext cx="2970720" cy="457560"/>
           </a:xfrm>
           <a:prstGeom prst="rect">
             <a:avLst/>
@@ -2025,7 +2187,7 @@
       </p:grpSpPr>
       <p:sp>
         <p:nvSpPr>
-          <p:cNvPr id="97" name="PlaceHolder 1"/>
+          <p:cNvPr id="93" name="PlaceHolder 1"/>
           <p:cNvSpPr>
             <a:spLocks noGrp="1"/>
           </p:cNvSpPr>
@@ -2048,7 +2210,7 @@
       </p:sp>
       <p:sp>
         <p:nvSpPr>
-          <p:cNvPr id="98" name="PlaceHolder 2"/>
+          <p:cNvPr id="94" name="PlaceHolder 2"/>
           <p:cNvSpPr>
             <a:spLocks noGrp="1"/>
           </p:cNvSpPr>
@@ -2059,7 +2221,7 @@
         <p:spPr>
           <a:xfrm>
             <a:off x="685800" y="4400640"/>
-            <a:ext cx="5485680" cy="3599640"/>
+            <a:ext cx="5485320" cy="3599280"/>
           </a:xfrm>
           <a:prstGeom prst="rect">
             <a:avLst/>
@@ -2088,18 +2250,18 @@
       </p:sp>
       <p:sp>
         <p:nvSpPr>
-          <p:cNvPr id="99" name="PlaceHolder 3"/>
+          <p:cNvPr id="95" name="PlaceHolder 3"/>
           <p:cNvSpPr>
             <a:spLocks noGrp="1"/>
           </p:cNvSpPr>
           <p:nvPr>
-            <p:ph type="sldNum" idx="23"/>
+            <p:ph type="sldNum" idx="16"/>
           </p:nvPr>
         </p:nvSpPr>
         <p:spPr>
           <a:xfrm>
             <a:off x="3884760" y="8685360"/>
-            <a:ext cx="2971080" cy="457920"/>
+            <a:ext cx="2970720" cy="457560"/>
           </a:xfrm>
           <a:prstGeom prst="rect">
             <a:avLst/>
@@ -2150,7 +2312,7 @@
       </p:grpSpPr>
       <p:sp>
         <p:nvSpPr>
-          <p:cNvPr id="100" name="PlaceHolder 1"/>
+          <p:cNvPr id="96" name="PlaceHolder 1"/>
           <p:cNvSpPr>
             <a:spLocks noGrp="1"/>
           </p:cNvSpPr>
@@ -2173,7 +2335,7 @@
       </p:sp>
       <p:sp>
         <p:nvSpPr>
-          <p:cNvPr id="101" name="PlaceHolder 2"/>
+          <p:cNvPr id="97" name="PlaceHolder 2"/>
           <p:cNvSpPr>
             <a:spLocks noGrp="1"/>
           </p:cNvSpPr>
@@ -2184,7 +2346,7 @@
         <p:spPr>
           <a:xfrm>
             <a:off x="685800" y="4400640"/>
-            <a:ext cx="5485680" cy="3599640"/>
+            <a:ext cx="5485320" cy="3599280"/>
           </a:xfrm>
           <a:prstGeom prst="rect">
             <a:avLst/>
@@ -2213,18 +2375,18 @@
       </p:sp>
       <p:sp>
         <p:nvSpPr>
-          <p:cNvPr id="102" name="PlaceHolder 3"/>
+          <p:cNvPr id="98" name="PlaceHolder 3"/>
           <p:cNvSpPr>
             <a:spLocks noGrp="1"/>
           </p:cNvSpPr>
           <p:nvPr>
-            <p:ph type="sldNum" idx="24"/>
+            <p:ph type="sldNum" idx="17"/>
           </p:nvPr>
         </p:nvSpPr>
         <p:spPr>
           <a:xfrm>
             <a:off x="3884760" y="8685360"/>
-            <a:ext cx="2971080" cy="457920"/>
+            <a:ext cx="2970720" cy="457560"/>
           </a:xfrm>
           <a:prstGeom prst="rect">
             <a:avLst/>
@@ -2275,7 +2437,7 @@
       </p:grpSpPr>
       <p:sp>
         <p:nvSpPr>
-          <p:cNvPr id="103" name="PlaceHolder 1"/>
+          <p:cNvPr id="99" name="PlaceHolder 1"/>
           <p:cNvSpPr>
             <a:spLocks noGrp="1"/>
           </p:cNvSpPr>
@@ -2298,7 +2460,7 @@
       </p:sp>
       <p:sp>
         <p:nvSpPr>
-          <p:cNvPr id="104" name="PlaceHolder 2"/>
+          <p:cNvPr id="100" name="PlaceHolder 2"/>
           <p:cNvSpPr>
             <a:spLocks noGrp="1"/>
           </p:cNvSpPr>
@@ -2309,7 +2471,7 @@
         <p:spPr>
           <a:xfrm>
             <a:off x="685800" y="4400640"/>
-            <a:ext cx="5485680" cy="3599640"/>
+            <a:ext cx="5485320" cy="3599280"/>
           </a:xfrm>
           <a:prstGeom prst="rect">
             <a:avLst/>
@@ -2338,18 +2500,18 @@
       </p:sp>
       <p:sp>
         <p:nvSpPr>
-          <p:cNvPr id="105" name="PlaceHolder 3"/>
+          <p:cNvPr id="101" name="PlaceHolder 3"/>
           <p:cNvSpPr>
             <a:spLocks noGrp="1"/>
           </p:cNvSpPr>
           <p:nvPr>
-            <p:ph type="sldNum" idx="25"/>
+            <p:ph type="sldNum" idx="18"/>
           </p:nvPr>
         </p:nvSpPr>
         <p:spPr>
           <a:xfrm>
             <a:off x="3884760" y="8685360"/>
-            <a:ext cx="2971080" cy="457920"/>
+            <a:ext cx="2970720" cy="457560"/>
           </a:xfrm>
           <a:prstGeom prst="rect">
             <a:avLst/>
@@ -2400,7 +2562,7 @@
       </p:grpSpPr>
       <p:sp>
         <p:nvSpPr>
-          <p:cNvPr id="106" name="PlaceHolder 1"/>
+          <p:cNvPr id="102" name="PlaceHolder 1"/>
           <p:cNvSpPr>
             <a:spLocks noGrp="1"/>
           </p:cNvSpPr>
@@ -2423,7 +2585,7 @@
       </p:sp>
       <p:sp>
         <p:nvSpPr>
-          <p:cNvPr id="107" name="PlaceHolder 2"/>
+          <p:cNvPr id="103" name="PlaceHolder 2"/>
           <p:cNvSpPr>
             <a:spLocks noGrp="1"/>
           </p:cNvSpPr>
@@ -2434,7 +2596,7 @@
         <p:spPr>
           <a:xfrm>
             <a:off x="685800" y="4400640"/>
-            <a:ext cx="5485680" cy="3599640"/>
+            <a:ext cx="5485320" cy="3599280"/>
           </a:xfrm>
           <a:prstGeom prst="rect">
             <a:avLst/>
@@ -2463,18 +2625,18 @@
       </p:sp>
       <p:sp>
         <p:nvSpPr>
-          <p:cNvPr id="108" name="PlaceHolder 3"/>
+          <p:cNvPr id="104" name="PlaceHolder 3"/>
           <p:cNvSpPr>
             <a:spLocks noGrp="1"/>
           </p:cNvSpPr>
           <p:nvPr>
-            <p:ph type="sldNum" idx="26"/>
+            <p:ph type="sldNum" idx="19"/>
           </p:nvPr>
         </p:nvSpPr>
         <p:spPr>
           <a:xfrm>
             <a:off x="3884760" y="8685360"/>
-            <a:ext cx="2971080" cy="457920"/>
+            <a:ext cx="2970720" cy="457560"/>
           </a:xfrm>
           <a:prstGeom prst="rect">
             <a:avLst/>
@@ -2579,7 +2741,7 @@
         <p:txBody>
           <a:bodyPr/>
           <a:p>
-            <a:fld id="{39FF55A7-647F-45CD-9954-A7E31C1B4619}" type="slidenum">
+            <a:fld id="{6B8EC556-FA7E-4B08-B9D9-CC8A5789BBBF}" type="slidenum">
               <a:t>&lt;#&gt;</a:t>
             </a:fld>
           </a:p>
@@ -2670,7 +2832,7 @@
         <p:spPr>
           <a:xfrm>
             <a:off x="0" y="1630080"/>
-            <a:ext cx="12189600" cy="5225400"/>
+            <a:ext cx="12189240" cy="5225040"/>
           </a:xfrm>
           <a:prstGeom prst="rect">
             <a:avLst/>
@@ -2693,7 +2855,7 @@
         <p:spPr>
           <a:xfrm>
             <a:off x="0" y="0"/>
-            <a:ext cx="12189600" cy="6855480"/>
+            <a:ext cx="12189240" cy="6855120"/>
           </a:xfrm>
           <a:prstGeom prst="rect">
             <a:avLst/>
@@ -2712,7 +2874,7 @@
         <p:spPr>
           <a:xfrm>
             <a:off x="633600" y="2893320"/>
-            <a:ext cx="1888200" cy="928800"/>
+            <a:ext cx="1887840" cy="928440"/>
           </a:xfrm>
           <a:prstGeom prst="rect">
             <a:avLst/>
@@ -2803,7 +2965,7 @@
                 </a:solidFill>
                 <a:latin typeface="Arial"/>
               </a:rPr>
-              <a:t>Clic</a:t>
+              <a:t>Click to </a:t>
             </a:r>
             <a:r>
               <a:rPr b="0" lang="en-US" sz="4400" spc="-1" strike="noStrike">
@@ -2812,7 +2974,7 @@
                 </a:solidFill>
                 <a:latin typeface="Arial"/>
               </a:rPr>
-              <a:t>k to </a:t>
+              <a:t>edit the </a:t>
             </a:r>
             <a:r>
               <a:rPr b="0" lang="en-US" sz="4400" spc="-1" strike="noStrike">
@@ -2821,7 +2983,7 @@
                 </a:solidFill>
                 <a:latin typeface="Arial"/>
               </a:rPr>
-              <a:t>edit </a:t>
+              <a:t>title </a:t>
             </a:r>
             <a:r>
               <a:rPr b="0" lang="en-US" sz="4400" spc="-1" strike="noStrike">
@@ -2830,7 +2992,7 @@
                 </a:solidFill>
                 <a:latin typeface="Arial"/>
               </a:rPr>
-              <a:t>the </a:t>
+              <a:t>text </a:t>
             </a:r>
             <a:r>
               <a:rPr b="0" lang="en-US" sz="4400" spc="-1" strike="noStrike">
@@ -2839,34 +3001,7 @@
                 </a:solidFill>
                 <a:latin typeface="Arial"/>
               </a:rPr>
-              <a:t>title </a:t>
-            </a:r>
-            <a:r>
-              <a:rPr b="0" lang="en-US" sz="4400" spc="-1" strike="noStrike">
-                <a:solidFill>
-                  <a:srgbClr val="000000"/>
-                </a:solidFill>
-                <a:latin typeface="Arial"/>
-              </a:rPr>
-              <a:t>text </a:t>
-            </a:r>
-            <a:r>
-              <a:rPr b="0" lang="en-US" sz="4400" spc="-1" strike="noStrike">
-                <a:solidFill>
-                  <a:srgbClr val="000000"/>
-                </a:solidFill>
-                <a:latin typeface="Arial"/>
-              </a:rPr>
-              <a:t>for</a:t>
-            </a:r>
-            <a:r>
-              <a:rPr b="0" lang="en-US" sz="4400" spc="-1" strike="noStrike">
-                <a:solidFill>
-                  <a:srgbClr val="000000"/>
-                </a:solidFill>
-                <a:latin typeface="Arial"/>
-              </a:rPr>
-              <a:t>mat</a:t>
+              <a:t>format</a:t>
             </a:r>
             <a:endParaRPr b="0" lang="en-US" sz="4400" spc="-1" strike="noStrike">
               <a:solidFill>
@@ -3148,7 +3283,7 @@
         <p:spPr>
           <a:xfrm>
             <a:off x="0" y="0"/>
-            <a:ext cx="12189600" cy="6855480"/>
+            <a:ext cx="12189240" cy="6855120"/>
           </a:xfrm>
           <a:prstGeom prst="rect">
             <a:avLst/>
@@ -3167,7 +3302,7 @@
         <p:spPr>
           <a:xfrm>
             <a:off x="10488600" y="6453360"/>
-            <a:ext cx="643320" cy="166680"/>
+            <a:ext cx="642960" cy="166320"/>
           </a:xfrm>
           <a:prstGeom prst="rect">
             <a:avLst/>
@@ -3216,7 +3351,7 @@
         <p:spPr>
           <a:xfrm>
             <a:off x="1981080" y="6344640"/>
-            <a:ext cx="8750160" cy="362520"/>
+            <a:ext cx="8749800" cy="362160"/>
           </a:xfrm>
           <a:prstGeom prst="rect">
             <a:avLst/>
@@ -3288,7 +3423,7 @@
         <p:spPr>
           <a:xfrm>
             <a:off x="10848960" y="6344640"/>
-            <a:ext cx="810720" cy="362520"/>
+            <a:ext cx="810360" cy="362160"/>
           </a:xfrm>
           <a:prstGeom prst="rect">
             <a:avLst/>
@@ -3329,7 +3464,7 @@
                 <a:tab algn="l" pos="0"/>
               </a:tabLst>
             </a:pPr>
-            <a:fld id="{3854AD86-852B-4866-A597-A0290A301EF9}" type="slidenum">
+            <a:fld id="{3733BEAF-59A5-481D-B3AA-BF19C69ECC3D}" type="slidenum">
               <a:rPr b="0" lang="de-DE" sz="1100" spc="-1" strike="noStrike">
                 <a:solidFill>
                   <a:srgbClr val="1d3c91"/>
@@ -3360,7 +3495,7 @@
         <p:spPr>
           <a:xfrm>
             <a:off x="630720" y="6344640"/>
-            <a:ext cx="1237680" cy="362520"/>
+            <a:ext cx="1237320" cy="362160"/>
           </a:xfrm>
           <a:prstGeom prst="rect">
             <a:avLst/>
@@ -3445,7 +3580,7 @@
                 </a:solidFill>
                 <a:latin typeface="Arial"/>
               </a:rPr>
-              <a:t>Clic</a:t>
+              <a:t>Click to </a:t>
             </a:r>
             <a:r>
               <a:rPr b="0" lang="en-US" sz="4400" spc="-1" strike="noStrike">
@@ -3454,7 +3589,7 @@
                 </a:solidFill>
                 <a:latin typeface="Arial"/>
               </a:rPr>
-              <a:t>k to </a:t>
+              <a:t>edit the </a:t>
             </a:r>
             <a:r>
               <a:rPr b="0" lang="en-US" sz="4400" spc="-1" strike="noStrike">
@@ -3463,7 +3598,7 @@
                 </a:solidFill>
                 <a:latin typeface="Arial"/>
               </a:rPr>
-              <a:t>edit </a:t>
+              <a:t>title </a:t>
             </a:r>
             <a:r>
               <a:rPr b="0" lang="en-US" sz="4400" spc="-1" strike="noStrike">
@@ -3472,7 +3607,7 @@
                 </a:solidFill>
                 <a:latin typeface="Arial"/>
               </a:rPr>
-              <a:t>the </a:t>
+              <a:t>text </a:t>
             </a:r>
             <a:r>
               <a:rPr b="0" lang="en-US" sz="4400" spc="-1" strike="noStrike">
@@ -3481,34 +3616,7 @@
                 </a:solidFill>
                 <a:latin typeface="Arial"/>
               </a:rPr>
-              <a:t>title </a:t>
-            </a:r>
-            <a:r>
-              <a:rPr b="0" lang="en-US" sz="4400" spc="-1" strike="noStrike">
-                <a:solidFill>
-                  <a:srgbClr val="000000"/>
-                </a:solidFill>
-                <a:latin typeface="Arial"/>
-              </a:rPr>
-              <a:t>text </a:t>
-            </a:r>
-            <a:r>
-              <a:rPr b="0" lang="en-US" sz="4400" spc="-1" strike="noStrike">
-                <a:solidFill>
-                  <a:srgbClr val="000000"/>
-                </a:solidFill>
-                <a:latin typeface="Arial"/>
-              </a:rPr>
-              <a:t>for</a:t>
-            </a:r>
-            <a:r>
-              <a:rPr b="0" lang="en-US" sz="4400" spc="-1" strike="noStrike">
-                <a:solidFill>
-                  <a:srgbClr val="000000"/>
-                </a:solidFill>
-                <a:latin typeface="Arial"/>
-              </a:rPr>
-              <a:t>mat</a:t>
+              <a:t>format</a:t>
             </a:r>
             <a:endParaRPr b="0" lang="en-US" sz="4400" spc="-1" strike="noStrike">
               <a:solidFill>
@@ -3790,7 +3898,7 @@
         <p:spPr>
           <a:xfrm>
             <a:off x="0" y="1630080"/>
-            <a:ext cx="12189960" cy="5225760"/>
+            <a:ext cx="12189600" cy="5225400"/>
           </a:xfrm>
           <a:prstGeom prst="rect">
             <a:avLst/>
@@ -3813,7 +3921,7 @@
         <p:spPr>
           <a:xfrm>
             <a:off x="0" y="0"/>
-            <a:ext cx="12189960" cy="6855840"/>
+            <a:ext cx="12189600" cy="6855480"/>
           </a:xfrm>
           <a:prstGeom prst="rect">
             <a:avLst/>
@@ -3832,7 +3940,7 @@
         <p:spPr>
           <a:xfrm>
             <a:off x="633600" y="2893320"/>
-            <a:ext cx="1888560" cy="929160"/>
+            <a:ext cx="1888200" cy="928800"/>
           </a:xfrm>
           <a:prstGeom prst="rect">
             <a:avLst/>
@@ -3923,7 +4031,43 @@
                 </a:solidFill>
                 <a:latin typeface="Arial"/>
               </a:rPr>
-              <a:t>Click to edit the title text format</a:t>
+              <a:t>Click to </a:t>
+            </a:r>
+            <a:r>
+              <a:rPr b="0" lang="en-US" sz="4400" spc="-1" strike="noStrike">
+                <a:solidFill>
+                  <a:srgbClr val="000000"/>
+                </a:solidFill>
+                <a:latin typeface="Arial"/>
+              </a:rPr>
+              <a:t>edit the </a:t>
+            </a:r>
+            <a:r>
+              <a:rPr b="0" lang="en-US" sz="4400" spc="-1" strike="noStrike">
+                <a:solidFill>
+                  <a:srgbClr val="000000"/>
+                </a:solidFill>
+                <a:latin typeface="Arial"/>
+              </a:rPr>
+              <a:t>title </a:t>
+            </a:r>
+            <a:r>
+              <a:rPr b="0" lang="en-US" sz="4400" spc="-1" strike="noStrike">
+                <a:solidFill>
+                  <a:srgbClr val="000000"/>
+                </a:solidFill>
+                <a:latin typeface="Arial"/>
+              </a:rPr>
+              <a:t>text </a:t>
+            </a:r>
+            <a:r>
+              <a:rPr b="0" lang="en-US" sz="4400" spc="-1" strike="noStrike">
+                <a:solidFill>
+                  <a:srgbClr val="000000"/>
+                </a:solidFill>
+                <a:latin typeface="Arial"/>
+              </a:rPr>
+              <a:t>format</a:t>
             </a:r>
             <a:endParaRPr b="0" lang="en-US" sz="4400" spc="-1" strike="noStrike">
               <a:solidFill>
@@ -4198,7 +4342,7 @@
         <p:spPr>
           <a:xfrm>
             <a:off x="623160" y="4437000"/>
-            <a:ext cx="10936080" cy="541080"/>
+            <a:ext cx="10935720" cy="540720"/>
           </a:xfrm>
           <a:prstGeom prst="rect">
             <a:avLst/>
@@ -4229,7 +4373,79 @@
                 </a:solidFill>
                 <a:latin typeface="Overpass"/>
               </a:rPr>
-              <a:t>Transfer optimizations on partitioned communication</a:t>
+              <a:t>Transfe</a:t>
+            </a:r>
+            <a:r>
+              <a:rPr b="1" lang="de-DE" sz="3300" spc="-1" strike="noStrike">
+                <a:solidFill>
+                  <a:srgbClr val="ffffff"/>
+                </a:solidFill>
+                <a:latin typeface="Overpass"/>
+              </a:rPr>
+              <a:t>r </a:t>
+            </a:r>
+            <a:r>
+              <a:rPr b="1" lang="de-DE" sz="3300" spc="-1" strike="noStrike">
+                <a:solidFill>
+                  <a:srgbClr val="ffffff"/>
+                </a:solidFill>
+                <a:latin typeface="Overpass"/>
+              </a:rPr>
+              <a:t>optimiz</a:t>
+            </a:r>
+            <a:r>
+              <a:rPr b="1" lang="de-DE" sz="3300" spc="-1" strike="noStrike">
+                <a:solidFill>
+                  <a:srgbClr val="ffffff"/>
+                </a:solidFill>
+                <a:latin typeface="Overpass"/>
+              </a:rPr>
+              <a:t>ations </a:t>
+            </a:r>
+            <a:r>
+              <a:rPr b="1" lang="de-DE" sz="3300" spc="-1" strike="noStrike">
+                <a:solidFill>
+                  <a:srgbClr val="ffffff"/>
+                </a:solidFill>
+                <a:latin typeface="Overpass"/>
+              </a:rPr>
+              <a:t>on </a:t>
+            </a:r>
+            <a:r>
+              <a:rPr b="1" lang="de-DE" sz="3300" spc="-1" strike="noStrike">
+                <a:solidFill>
+                  <a:srgbClr val="ffffff"/>
+                </a:solidFill>
+                <a:latin typeface="Overpass"/>
+              </a:rPr>
+              <a:t>partitio</a:t>
+            </a:r>
+            <a:r>
+              <a:rPr b="1" lang="de-DE" sz="3300" spc="-1" strike="noStrike">
+                <a:solidFill>
+                  <a:srgbClr val="ffffff"/>
+                </a:solidFill>
+                <a:latin typeface="Overpass"/>
+              </a:rPr>
+              <a:t>ned </a:t>
+            </a:r>
+            <a:r>
+              <a:rPr b="1" lang="de-DE" sz="3300" spc="-1" strike="noStrike">
+                <a:solidFill>
+                  <a:srgbClr val="ffffff"/>
+                </a:solidFill>
+                <a:latin typeface="Overpass"/>
+              </a:rPr>
+              <a:t>commu</a:t>
+            </a:r>
+            <a:r>
+              <a:rPr b="1" lang="de-DE" sz="3300" spc="-1" strike="noStrike">
+                <a:solidFill>
+                  <a:srgbClr val="ffffff"/>
+                </a:solidFill>
+                <a:latin typeface="Overpass"/>
+              </a:rPr>
+              <a:t>nication</a:t>
             </a:r>
             <a:endParaRPr b="0" lang="en-US" sz="3300" spc="-1" strike="noStrike">
               <a:solidFill>
@@ -4249,7 +4465,7 @@
         <p:spPr>
           <a:xfrm>
             <a:off x="623520" y="5337360"/>
-            <a:ext cx="10513080" cy="541080"/>
+            <a:ext cx="10512720" cy="540720"/>
           </a:xfrm>
           <a:prstGeom prst="rect">
             <a:avLst/>
@@ -4326,14 +4542,14 @@
       </p:grpSpPr>
       <p:sp>
         <p:nvSpPr>
-          <p:cNvPr id="53" name=""/>
+          <p:cNvPr id="51" name=""/>
           <p:cNvSpPr/>
           <p:nvPr/>
         </p:nvSpPr>
         <p:spPr>
           <a:xfrm>
             <a:off x="685800" y="1371600"/>
-            <a:ext cx="10742760" cy="4570560"/>
+            <a:ext cx="10742400" cy="4570200"/>
           </a:xfrm>
           <a:prstGeom prst="rect">
             <a:avLst/>
@@ -4371,14 +4587,14 @@
       </p:sp>
       <p:sp>
         <p:nvSpPr>
-          <p:cNvPr id="54" name="PlaceHolder 4"/>
+          <p:cNvPr id="52" name="PlaceHolder 4"/>
           <p:cNvSpPr/>
           <p:nvPr/>
         </p:nvSpPr>
         <p:spPr>
           <a:xfrm>
             <a:off x="624240" y="479880"/>
-            <a:ext cx="8067600" cy="609480"/>
+            <a:ext cx="8067240" cy="609120"/>
           </a:xfrm>
           <a:prstGeom prst="rect">
             <a:avLst/>
@@ -4426,81 +4642,9 @@
           </a:p>
         </p:txBody>
       </p:sp>
-      <p:sp>
-        <p:nvSpPr>
-          <p:cNvPr id="55" name="PlaceHolder 1"/>
-          <p:cNvSpPr>
-            <a:spLocks noGrp="1"/>
-          </p:cNvSpPr>
-          <p:nvPr>
-            <p:ph type="ftr" idx="12"/>
-          </p:nvPr>
-        </p:nvSpPr>
-        <p:spPr>
-          <a:xfrm>
-            <a:off x="1981080" y="6344640"/>
-            <a:ext cx="8750160" cy="362520"/>
-          </a:xfrm>
-          <a:prstGeom prst="rect">
-            <a:avLst/>
-          </a:prstGeom>
-          <a:noFill/>
-          <a:ln w="0">
-            <a:noFill/>
-          </a:ln>
-        </p:spPr>
-        <p:txBody>
-          <a:bodyPr lIns="90000" rIns="90000" tIns="45000" bIns="45000" anchor="ctr">
-            <a:noAutofit/>
-          </a:bodyPr>
-          <a:lstStyle>
-            <a:lvl1pPr indent="0" algn="ctr">
-              <a:lnSpc>
-                <a:spcPct val="100000"/>
-              </a:lnSpc>
-              <a:buNone/>
-              <a:tabLst>
-                <a:tab algn="l" pos="0"/>
-              </a:tabLst>
-              <a:defRPr b="1" lang="de-DE" sz="1100" spc="-1" strike="noStrike">
-                <a:solidFill>
-                  <a:srgbClr val="1d3c91"/>
-                </a:solidFill>
-                <a:latin typeface="Overpass"/>
-              </a:defRPr>
-            </a:lvl1pPr>
-          </a:lstStyle>
-          <a:p>
-            <a:pPr indent="0" algn="ctr">
-              <a:lnSpc>
-                <a:spcPct val="100000"/>
-              </a:lnSpc>
-              <a:buNone/>
-              <a:tabLst>
-                <a:tab algn="l" pos="0"/>
-              </a:tabLst>
-            </a:pPr>
-            <a:r>
-              <a:rPr b="1" lang="de-DE" sz="1100" spc="-1" strike="noStrike">
-                <a:solidFill>
-                  <a:srgbClr val="1d3c91"/>
-                </a:solidFill>
-                <a:latin typeface="Overpass"/>
-              </a:rPr>
-              <a:t>IPTW 2023 - 5./6. October 2023</a:t>
-            </a:r>
-            <a:endParaRPr b="0" lang="en-US" sz="1100" spc="-1" strike="noStrike">
-              <a:solidFill>
-                <a:srgbClr val="000000"/>
-              </a:solidFill>
-              <a:latin typeface="Times New Roman"/>
-            </a:endParaRPr>
-          </a:p>
-        </p:txBody>
-      </p:sp>
       <p:pic>
         <p:nvPicPr>
-          <p:cNvPr id="56" name="" descr=""/>
+          <p:cNvPr id="53" name="" descr=""/>
           <p:cNvPicPr/>
           <p:nvPr/>
         </p:nvPicPr>
@@ -4511,7 +4655,7 @@
         <p:spPr>
           <a:xfrm>
             <a:off x="3182400" y="1237680"/>
-            <a:ext cx="5851440" cy="4388400"/>
+            <a:ext cx="5851080" cy="4388040"/>
           </a:xfrm>
           <a:prstGeom prst="rect">
             <a:avLst/>
@@ -4553,14 +4697,14 @@
       </p:grpSpPr>
       <p:sp>
         <p:nvSpPr>
-          <p:cNvPr id="57" name=""/>
+          <p:cNvPr id="54" name=""/>
           <p:cNvSpPr/>
           <p:nvPr/>
         </p:nvSpPr>
         <p:spPr>
           <a:xfrm>
             <a:off x="685800" y="1371600"/>
-            <a:ext cx="10742760" cy="4570560"/>
+            <a:ext cx="10742400" cy="4570200"/>
           </a:xfrm>
           <a:prstGeom prst="rect">
             <a:avLst/>
@@ -4598,14 +4742,14 @@
       </p:sp>
       <p:sp>
         <p:nvSpPr>
-          <p:cNvPr id="58" name="PlaceHolder 4"/>
+          <p:cNvPr id="55" name="PlaceHolder 4"/>
           <p:cNvSpPr/>
           <p:nvPr/>
         </p:nvSpPr>
         <p:spPr>
           <a:xfrm>
             <a:off x="624240" y="479880"/>
-            <a:ext cx="8067600" cy="609480"/>
+            <a:ext cx="8067240" cy="609120"/>
           </a:xfrm>
           <a:prstGeom prst="rect">
             <a:avLst/>
@@ -4653,81 +4797,9 @@
           </a:p>
         </p:txBody>
       </p:sp>
-      <p:sp>
-        <p:nvSpPr>
-          <p:cNvPr id="59" name="PlaceHolder 1"/>
-          <p:cNvSpPr>
-            <a:spLocks noGrp="1"/>
-          </p:cNvSpPr>
-          <p:nvPr>
-            <p:ph type="ftr" idx="13"/>
-          </p:nvPr>
-        </p:nvSpPr>
-        <p:spPr>
-          <a:xfrm>
-            <a:off x="1981080" y="6344640"/>
-            <a:ext cx="8750160" cy="362520"/>
-          </a:xfrm>
-          <a:prstGeom prst="rect">
-            <a:avLst/>
-          </a:prstGeom>
-          <a:noFill/>
-          <a:ln w="0">
-            <a:noFill/>
-          </a:ln>
-        </p:spPr>
-        <p:txBody>
-          <a:bodyPr lIns="90000" rIns="90000" tIns="45000" bIns="45000" anchor="ctr">
-            <a:noAutofit/>
-          </a:bodyPr>
-          <a:lstStyle>
-            <a:lvl1pPr indent="0" algn="ctr">
-              <a:lnSpc>
-                <a:spcPct val="100000"/>
-              </a:lnSpc>
-              <a:buNone/>
-              <a:tabLst>
-                <a:tab algn="l" pos="0"/>
-              </a:tabLst>
-              <a:defRPr b="1" lang="de-DE" sz="1100" spc="-1" strike="noStrike">
-                <a:solidFill>
-                  <a:srgbClr val="1d3c91"/>
-                </a:solidFill>
-                <a:latin typeface="Overpass"/>
-              </a:defRPr>
-            </a:lvl1pPr>
-          </a:lstStyle>
-          <a:p>
-            <a:pPr indent="0" algn="ctr">
-              <a:lnSpc>
-                <a:spcPct val="100000"/>
-              </a:lnSpc>
-              <a:buNone/>
-              <a:tabLst>
-                <a:tab algn="l" pos="0"/>
-              </a:tabLst>
-            </a:pPr>
-            <a:r>
-              <a:rPr b="1" lang="de-DE" sz="1100" spc="-1" strike="noStrike">
-                <a:solidFill>
-                  <a:srgbClr val="1d3c91"/>
-                </a:solidFill>
-                <a:latin typeface="Overpass"/>
-              </a:rPr>
-              <a:t>IPTW 2023 - 5./6. October 2023</a:t>
-            </a:r>
-            <a:endParaRPr b="0" lang="en-US" sz="1100" spc="-1" strike="noStrike">
-              <a:solidFill>
-                <a:srgbClr val="000000"/>
-              </a:solidFill>
-              <a:latin typeface="Times New Roman"/>
-            </a:endParaRPr>
-          </a:p>
-        </p:txBody>
-      </p:sp>
       <p:pic>
         <p:nvPicPr>
-          <p:cNvPr id="60" name="" descr=""/>
+          <p:cNvPr id="56" name="" descr=""/>
           <p:cNvPicPr/>
           <p:nvPr/>
         </p:nvPicPr>
@@ -4738,7 +4810,7 @@
         <p:spPr>
           <a:xfrm>
             <a:off x="3182400" y="1237680"/>
-            <a:ext cx="5851800" cy="4388760"/>
+            <a:ext cx="5851440" cy="4388400"/>
           </a:xfrm>
           <a:prstGeom prst="rect">
             <a:avLst/>
@@ -4780,14 +4852,14 @@
       </p:grpSpPr>
       <p:sp>
         <p:nvSpPr>
-          <p:cNvPr id="61" name=""/>
+          <p:cNvPr id="57" name=""/>
           <p:cNvSpPr/>
           <p:nvPr/>
         </p:nvSpPr>
         <p:spPr>
           <a:xfrm>
             <a:off x="685800" y="1371600"/>
-            <a:ext cx="10742760" cy="4570560"/>
+            <a:ext cx="10742400" cy="4570200"/>
           </a:xfrm>
           <a:prstGeom prst="rect">
             <a:avLst/>
@@ -4825,14 +4897,14 @@
       </p:sp>
       <p:sp>
         <p:nvSpPr>
-          <p:cNvPr id="62" name="PlaceHolder 4"/>
+          <p:cNvPr id="58" name="PlaceHolder 4"/>
           <p:cNvSpPr/>
           <p:nvPr/>
         </p:nvSpPr>
         <p:spPr>
           <a:xfrm>
             <a:off x="624240" y="479880"/>
-            <a:ext cx="8067600" cy="609480"/>
+            <a:ext cx="8067240" cy="609120"/>
           </a:xfrm>
           <a:prstGeom prst="rect">
             <a:avLst/>
@@ -4869,92 +4941,20 @@
                 <a:latin typeface="Overpass"/>
                 <a:ea typeface="DejaVu Sans"/>
               </a:rPr>
-              <a:t>OpenMPI: Pready</a:t>
+              <a:t>OpenMPI: Psend</a:t>
             </a:r>
             <a:endParaRPr b="0" lang="en-US" sz="2400" spc="-1" strike="noStrike">
               <a:solidFill>
                 <a:srgbClr val="000000"/>
               </a:solidFill>
               <a:latin typeface="Arial"/>
-            </a:endParaRPr>
-          </a:p>
-        </p:txBody>
-      </p:sp>
-      <p:sp>
-        <p:nvSpPr>
-          <p:cNvPr id="63" name="PlaceHolder 1"/>
-          <p:cNvSpPr>
-            <a:spLocks noGrp="1"/>
-          </p:cNvSpPr>
-          <p:nvPr>
-            <p:ph type="ftr" idx="14"/>
-          </p:nvPr>
-        </p:nvSpPr>
-        <p:spPr>
-          <a:xfrm>
-            <a:off x="1981080" y="6344640"/>
-            <a:ext cx="8750160" cy="362520"/>
-          </a:xfrm>
-          <a:prstGeom prst="rect">
-            <a:avLst/>
-          </a:prstGeom>
-          <a:noFill/>
-          <a:ln w="0">
-            <a:noFill/>
-          </a:ln>
-        </p:spPr>
-        <p:txBody>
-          <a:bodyPr lIns="90000" rIns="90000" tIns="45000" bIns="45000" anchor="ctr">
-            <a:noAutofit/>
-          </a:bodyPr>
-          <a:lstStyle>
-            <a:lvl1pPr indent="0" algn="ctr">
-              <a:lnSpc>
-                <a:spcPct val="100000"/>
-              </a:lnSpc>
-              <a:buNone/>
-              <a:tabLst>
-                <a:tab algn="l" pos="0"/>
-              </a:tabLst>
-              <a:defRPr b="1" lang="de-DE" sz="1100" spc="-1" strike="noStrike">
-                <a:solidFill>
-                  <a:srgbClr val="1d3c91"/>
-                </a:solidFill>
-                <a:latin typeface="Overpass"/>
-              </a:defRPr>
-            </a:lvl1pPr>
-          </a:lstStyle>
-          <a:p>
-            <a:pPr indent="0" algn="ctr">
-              <a:lnSpc>
-                <a:spcPct val="100000"/>
-              </a:lnSpc>
-              <a:buNone/>
-              <a:tabLst>
-                <a:tab algn="l" pos="0"/>
-              </a:tabLst>
-            </a:pPr>
-            <a:r>
-              <a:rPr b="1" lang="de-DE" sz="1100" spc="-1" strike="noStrike">
-                <a:solidFill>
-                  <a:srgbClr val="1d3c91"/>
-                </a:solidFill>
-                <a:latin typeface="Overpass"/>
-              </a:rPr>
-              <a:t>IPTW 2023 - 5./6. October 2023</a:t>
-            </a:r>
-            <a:endParaRPr b="0" lang="en-US" sz="1100" spc="-1" strike="noStrike">
-              <a:solidFill>
-                <a:srgbClr val="000000"/>
-              </a:solidFill>
-              <a:latin typeface="Times New Roman"/>
             </a:endParaRPr>
           </a:p>
         </p:txBody>
       </p:sp>
       <p:pic>
         <p:nvPicPr>
-          <p:cNvPr id="64" name="" descr=""/>
+          <p:cNvPr id="59" name="" descr=""/>
           <p:cNvPicPr/>
           <p:nvPr/>
         </p:nvPicPr>
@@ -4965,7 +4965,7 @@
         <p:spPr>
           <a:xfrm>
             <a:off x="3182400" y="1237680"/>
-            <a:ext cx="5851800" cy="4388760"/>
+            <a:ext cx="5851440" cy="4388400"/>
           </a:xfrm>
           <a:prstGeom prst="rect">
             <a:avLst/>
@@ -5007,14 +5007,14 @@
       </p:grpSpPr>
       <p:sp>
         <p:nvSpPr>
-          <p:cNvPr id="65" name=""/>
+          <p:cNvPr id="60" name=""/>
           <p:cNvSpPr/>
           <p:nvPr/>
         </p:nvSpPr>
         <p:spPr>
           <a:xfrm>
             <a:off x="685800" y="1371600"/>
-            <a:ext cx="10742760" cy="4570560"/>
+            <a:ext cx="10742400" cy="4570200"/>
           </a:xfrm>
           <a:prstGeom prst="rect">
             <a:avLst/>
@@ -5052,14 +5052,14 @@
       </p:sp>
       <p:sp>
         <p:nvSpPr>
-          <p:cNvPr id="66" name="PlaceHolder 4"/>
+          <p:cNvPr id="61" name="PlaceHolder 4"/>
           <p:cNvSpPr/>
           <p:nvPr/>
         </p:nvSpPr>
         <p:spPr>
           <a:xfrm>
             <a:off x="624240" y="479880"/>
-            <a:ext cx="8067600" cy="609480"/>
+            <a:ext cx="8067240" cy="609120"/>
           </a:xfrm>
           <a:prstGeom prst="rect">
             <a:avLst/>
@@ -5096,92 +5096,20 @@
                 <a:latin typeface="Overpass"/>
                 <a:ea typeface="DejaVu Sans"/>
               </a:rPr>
-              <a:t>OpenMPI: MPI_Win per partition</a:t>
+              <a:t>OpenMPI: Psend vs Isend</a:t>
             </a:r>
             <a:endParaRPr b="0" lang="en-US" sz="2400" spc="-1" strike="noStrike">
               <a:solidFill>
                 <a:srgbClr val="000000"/>
               </a:solidFill>
               <a:latin typeface="Arial"/>
-            </a:endParaRPr>
-          </a:p>
-        </p:txBody>
-      </p:sp>
-      <p:sp>
-        <p:nvSpPr>
-          <p:cNvPr id="67" name="PlaceHolder 1"/>
-          <p:cNvSpPr>
-            <a:spLocks noGrp="1"/>
-          </p:cNvSpPr>
-          <p:nvPr>
-            <p:ph type="ftr" idx="15"/>
-          </p:nvPr>
-        </p:nvSpPr>
-        <p:spPr>
-          <a:xfrm>
-            <a:off x="1981080" y="6344640"/>
-            <a:ext cx="8750160" cy="362520"/>
-          </a:xfrm>
-          <a:prstGeom prst="rect">
-            <a:avLst/>
-          </a:prstGeom>
-          <a:noFill/>
-          <a:ln w="0">
-            <a:noFill/>
-          </a:ln>
-        </p:spPr>
-        <p:txBody>
-          <a:bodyPr lIns="90000" rIns="90000" tIns="45000" bIns="45000" anchor="ctr">
-            <a:noAutofit/>
-          </a:bodyPr>
-          <a:lstStyle>
-            <a:lvl1pPr indent="0" algn="ctr">
-              <a:lnSpc>
-                <a:spcPct val="100000"/>
-              </a:lnSpc>
-              <a:buNone/>
-              <a:tabLst>
-                <a:tab algn="l" pos="0"/>
-              </a:tabLst>
-              <a:defRPr b="1" lang="de-DE" sz="1100" spc="-1" strike="noStrike">
-                <a:solidFill>
-                  <a:srgbClr val="1d3c91"/>
-                </a:solidFill>
-                <a:latin typeface="Overpass"/>
-              </a:defRPr>
-            </a:lvl1pPr>
-          </a:lstStyle>
-          <a:p>
-            <a:pPr indent="0" algn="ctr">
-              <a:lnSpc>
-                <a:spcPct val="100000"/>
-              </a:lnSpc>
-              <a:buNone/>
-              <a:tabLst>
-                <a:tab algn="l" pos="0"/>
-              </a:tabLst>
-            </a:pPr>
-            <a:r>
-              <a:rPr b="1" lang="de-DE" sz="1100" spc="-1" strike="noStrike">
-                <a:solidFill>
-                  <a:srgbClr val="1d3c91"/>
-                </a:solidFill>
-                <a:latin typeface="Overpass"/>
-              </a:rPr>
-              <a:t>IPTW 2023 - 5./6. October 2023</a:t>
-            </a:r>
-            <a:endParaRPr b="0" lang="en-US" sz="1100" spc="-1" strike="noStrike">
-              <a:solidFill>
-                <a:srgbClr val="000000"/>
-              </a:solidFill>
-              <a:latin typeface="Times New Roman"/>
             </a:endParaRPr>
           </a:p>
         </p:txBody>
       </p:sp>
       <p:pic>
         <p:nvPicPr>
-          <p:cNvPr id="68" name="" descr=""/>
+          <p:cNvPr id="62" name="" descr=""/>
           <p:cNvPicPr/>
           <p:nvPr/>
         </p:nvPicPr>
@@ -5234,14 +5162,14 @@
       </p:grpSpPr>
       <p:sp>
         <p:nvSpPr>
-          <p:cNvPr id="69" name=""/>
+          <p:cNvPr id="63" name=""/>
           <p:cNvSpPr/>
           <p:nvPr/>
         </p:nvSpPr>
         <p:spPr>
           <a:xfrm>
             <a:off x="685800" y="1371600"/>
-            <a:ext cx="10742760" cy="4570560"/>
+            <a:ext cx="10742400" cy="4570200"/>
           </a:xfrm>
           <a:prstGeom prst="rect">
             <a:avLst/>
@@ -5279,14 +5207,14 @@
       </p:sp>
       <p:sp>
         <p:nvSpPr>
-          <p:cNvPr id="70" name="PlaceHolder 4"/>
+          <p:cNvPr id="64" name="PlaceHolder 4"/>
           <p:cNvSpPr/>
           <p:nvPr/>
         </p:nvSpPr>
         <p:spPr>
           <a:xfrm>
             <a:off x="624240" y="479880"/>
-            <a:ext cx="8572320" cy="609480"/>
+            <a:ext cx="8067240" cy="609120"/>
           </a:xfrm>
           <a:prstGeom prst="rect">
             <a:avLst/>
@@ -5323,92 +5251,20 @@
                 <a:latin typeface="Overpass"/>
                 <a:ea typeface="DejaVu Sans"/>
               </a:rPr>
-              <a:t>OpenMPI: MPI_Win for entire buffer</a:t>
+              <a:t>OpenMPI: MPI_Win per partition</a:t>
             </a:r>
             <a:endParaRPr b="0" lang="en-US" sz="2400" spc="-1" strike="noStrike">
               <a:solidFill>
                 <a:srgbClr val="000000"/>
               </a:solidFill>
               <a:latin typeface="Arial"/>
-            </a:endParaRPr>
-          </a:p>
-        </p:txBody>
-      </p:sp>
-      <p:sp>
-        <p:nvSpPr>
-          <p:cNvPr id="71" name="PlaceHolder 1"/>
-          <p:cNvSpPr>
-            <a:spLocks noGrp="1"/>
-          </p:cNvSpPr>
-          <p:nvPr>
-            <p:ph type="ftr" idx="16"/>
-          </p:nvPr>
-        </p:nvSpPr>
-        <p:spPr>
-          <a:xfrm>
-            <a:off x="1981080" y="6344640"/>
-            <a:ext cx="8750160" cy="362520"/>
-          </a:xfrm>
-          <a:prstGeom prst="rect">
-            <a:avLst/>
-          </a:prstGeom>
-          <a:noFill/>
-          <a:ln w="0">
-            <a:noFill/>
-          </a:ln>
-        </p:spPr>
-        <p:txBody>
-          <a:bodyPr lIns="90000" rIns="90000" tIns="45000" bIns="45000" anchor="ctr">
-            <a:noAutofit/>
-          </a:bodyPr>
-          <a:lstStyle>
-            <a:lvl1pPr indent="0" algn="ctr">
-              <a:lnSpc>
-                <a:spcPct val="100000"/>
-              </a:lnSpc>
-              <a:buNone/>
-              <a:tabLst>
-                <a:tab algn="l" pos="0"/>
-              </a:tabLst>
-              <a:defRPr b="1" lang="de-DE" sz="1100" spc="-1" strike="noStrike">
-                <a:solidFill>
-                  <a:srgbClr val="1d3c91"/>
-                </a:solidFill>
-                <a:latin typeface="Overpass"/>
-              </a:defRPr>
-            </a:lvl1pPr>
-          </a:lstStyle>
-          <a:p>
-            <a:pPr indent="0" algn="ctr">
-              <a:lnSpc>
-                <a:spcPct val="100000"/>
-              </a:lnSpc>
-              <a:buNone/>
-              <a:tabLst>
-                <a:tab algn="l" pos="0"/>
-              </a:tabLst>
-            </a:pPr>
-            <a:r>
-              <a:rPr b="1" lang="de-DE" sz="1100" spc="-1" strike="noStrike">
-                <a:solidFill>
-                  <a:srgbClr val="1d3c91"/>
-                </a:solidFill>
-                <a:latin typeface="Overpass"/>
-              </a:rPr>
-              <a:t>IPTW 2023 - 5./6. October 2023</a:t>
-            </a:r>
-            <a:endParaRPr b="0" lang="en-US" sz="1100" spc="-1" strike="noStrike">
-              <a:solidFill>
-                <a:srgbClr val="000000"/>
-              </a:solidFill>
-              <a:latin typeface="Times New Roman"/>
             </a:endParaRPr>
           </a:p>
         </p:txBody>
       </p:sp>
       <p:pic>
         <p:nvPicPr>
-          <p:cNvPr id="72" name="" descr=""/>
+          <p:cNvPr id="65" name="" descr=""/>
           <p:cNvPicPr/>
           <p:nvPr/>
         </p:nvPicPr>
@@ -5419,7 +5275,7 @@
         <p:spPr>
           <a:xfrm>
             <a:off x="3182400" y="1237680"/>
-            <a:ext cx="5851800" cy="4388760"/>
+            <a:ext cx="5851440" cy="4388400"/>
           </a:xfrm>
           <a:prstGeom prst="rect">
             <a:avLst/>
@@ -5461,14 +5317,14 @@
       </p:grpSpPr>
       <p:sp>
         <p:nvSpPr>
-          <p:cNvPr id="73" name=""/>
+          <p:cNvPr id="66" name=""/>
           <p:cNvSpPr/>
           <p:nvPr/>
         </p:nvSpPr>
         <p:spPr>
           <a:xfrm>
             <a:off x="685800" y="1371600"/>
-            <a:ext cx="10742760" cy="4570560"/>
+            <a:ext cx="10742400" cy="4570200"/>
           </a:xfrm>
           <a:prstGeom prst="rect">
             <a:avLst/>
@@ -5506,14 +5362,14 @@
       </p:sp>
       <p:sp>
         <p:nvSpPr>
-          <p:cNvPr id="74" name="PlaceHolder 4"/>
+          <p:cNvPr id="67" name="PlaceHolder 4"/>
           <p:cNvSpPr/>
           <p:nvPr/>
         </p:nvSpPr>
         <p:spPr>
           <a:xfrm>
             <a:off x="624240" y="479880"/>
-            <a:ext cx="8067600" cy="609480"/>
+            <a:ext cx="8571960" cy="609120"/>
           </a:xfrm>
           <a:prstGeom prst="rect">
             <a:avLst/>
@@ -5550,7 +5406,7 @@
                 <a:latin typeface="Overpass"/>
                 <a:ea typeface="DejaVu Sans"/>
               </a:rPr>
-              <a:t>Results: Psend on MPICH-4.1.2</a:t>
+              <a:t>OpenMPI: MPI_Win for entire buffer</a:t>
             </a:r>
             <a:endParaRPr b="0" lang="en-US" sz="2400" spc="-1" strike="noStrike">
               <a:solidFill>
@@ -5563,7 +5419,7 @@
       </p:sp>
       <p:pic>
         <p:nvPicPr>
-          <p:cNvPr id="75" name="" descr=""/>
+          <p:cNvPr id="68" name="" descr=""/>
           <p:cNvPicPr/>
           <p:nvPr/>
         </p:nvPicPr>
@@ -5573,8 +5429,8 @@
         </p:blipFill>
         <p:spPr>
           <a:xfrm>
-            <a:off x="3085200" y="1263240"/>
-            <a:ext cx="6020640" cy="4697640"/>
+            <a:off x="3182400" y="1237680"/>
+            <a:ext cx="5851440" cy="4388400"/>
           </a:xfrm>
           <a:prstGeom prst="rect">
             <a:avLst/>
@@ -5616,18 +5472,14 @@
       </p:grpSpPr>
       <p:sp>
         <p:nvSpPr>
-          <p:cNvPr id="76" name="PlaceHolder 1"/>
-          <p:cNvSpPr>
-            <a:spLocks noGrp="1"/>
-          </p:cNvSpPr>
-          <p:nvPr>
-            <p:ph type="title"/>
-          </p:nvPr>
-        </p:nvSpPr>
-        <p:spPr>
-          <a:xfrm>
-            <a:off x="623880" y="479880"/>
-            <a:ext cx="8067600" cy="609480"/>
+          <p:cNvPr id="69" name=""/>
+          <p:cNvSpPr/>
+          <p:nvPr/>
+        </p:nvSpPr>
+        <p:spPr>
+          <a:xfrm>
+            <a:off x="685800" y="1371600"/>
+            <a:ext cx="10742400" cy="4570200"/>
           </a:xfrm>
           <a:prstGeom prst="rect">
             <a:avLst/>
@@ -5637,16 +5489,66 @@
             <a:noFill/>
           </a:ln>
         </p:spPr>
+        <p:style>
+          <a:lnRef idx="0"/>
+          <a:fillRef idx="0"/>
+          <a:effectRef idx="0"/>
+          <a:fontRef idx="minor"/>
+        </p:style>
+        <p:txBody>
+          <a:bodyPr lIns="90000" rIns="90000" tIns="45000" bIns="45000" anchor="t">
+            <a:noAutofit/>
+          </a:bodyPr>
+          <a:p>
+            <a:pPr>
+              <a:lnSpc>
+                <a:spcPct val="100000"/>
+              </a:lnSpc>
+            </a:pPr>
+            <a:endParaRPr b="0" lang="en-US" sz="1800" spc="-1" strike="noStrike">
+              <a:solidFill>
+                <a:srgbClr val="000000"/>
+              </a:solidFill>
+              <a:latin typeface="Arial"/>
+              <a:ea typeface="DejaVu Sans"/>
+            </a:endParaRPr>
+          </a:p>
+        </p:txBody>
+      </p:sp>
+      <p:sp>
+        <p:nvSpPr>
+          <p:cNvPr id="70" name="PlaceHolder 4"/>
+          <p:cNvSpPr/>
+          <p:nvPr/>
+        </p:nvSpPr>
+        <p:spPr>
+          <a:xfrm>
+            <a:off x="624240" y="479880"/>
+            <a:ext cx="8067240" cy="609120"/>
+          </a:xfrm>
+          <a:prstGeom prst="rect">
+            <a:avLst/>
+          </a:prstGeom>
+          <a:noFill/>
+          <a:ln w="0">
+            <a:noFill/>
+          </a:ln>
+        </p:spPr>
+        <p:style>
+          <a:lnRef idx="0"/>
+          <a:fillRef idx="0"/>
+          <a:effectRef idx="0"/>
+          <a:fontRef idx="minor"/>
+        </p:style>
         <p:txBody>
           <a:bodyPr lIns="0" rIns="0" tIns="0" bIns="0" anchor="b">
             <a:noAutofit/>
           </a:bodyPr>
           <a:p>
-            <a:pPr indent="0">
+            <a:pPr>
               <a:lnSpc>
                 <a:spcPct val="90000"/>
               </a:lnSpc>
-              <a:buNone/>
               <a:tabLst>
                 <a:tab algn="l" pos="0"/>
               </a:tabLst>
@@ -5657,12 +5559,10 @@
                   <a:srgbClr val="1d3d91"/>
                 </a:solidFill>
                 <a:latin typeface="Overpass"/>
-              </a:rPr>
-              <a:t>Program Day 2:</a:t>
-            </a:r>
-            <a:br>
-              <a:rPr sz="2400"/>
-            </a:br>
+                <a:ea typeface="DejaVu Sans"/>
+              </a:rPr>
+              <a:t>Results: Psend on MPICH-4.1.2</a:t>
+            </a:r>
             <a:endParaRPr b="0" lang="en-US" sz="2400" spc="-1" strike="noStrike">
               <a:solidFill>
                 <a:srgbClr val="000000"/>
@@ -5674,7 +5574,7 @@
       </p:sp>
       <p:pic>
         <p:nvPicPr>
-          <p:cNvPr id="77" name="" descr=""/>
+          <p:cNvPr id="71" name="" descr=""/>
           <p:cNvPicPr/>
           <p:nvPr/>
         </p:nvPicPr>
@@ -5684,8 +5584,8 @@
         </p:blipFill>
         <p:spPr>
           <a:xfrm>
-            <a:off x="900000" y="848160"/>
-            <a:ext cx="6117840" cy="5369040"/>
+            <a:off x="3085200" y="1263240"/>
+            <a:ext cx="6020280" cy="4697280"/>
           </a:xfrm>
           <a:prstGeom prst="rect">
             <a:avLst/>
@@ -5695,78 +5595,6 @@
           </a:ln>
         </p:spPr>
       </p:pic>
-      <p:sp>
-        <p:nvSpPr>
-          <p:cNvPr id="78" name="PlaceHolder 2"/>
-          <p:cNvSpPr>
-            <a:spLocks noGrp="1"/>
-          </p:cNvSpPr>
-          <p:nvPr>
-            <p:ph type="ftr" idx="17"/>
-          </p:nvPr>
-        </p:nvSpPr>
-        <p:spPr>
-          <a:xfrm>
-            <a:off x="1981080" y="6344640"/>
-            <a:ext cx="8750160" cy="362520"/>
-          </a:xfrm>
-          <a:prstGeom prst="rect">
-            <a:avLst/>
-          </a:prstGeom>
-          <a:noFill/>
-          <a:ln w="0">
-            <a:noFill/>
-          </a:ln>
-        </p:spPr>
-        <p:txBody>
-          <a:bodyPr lIns="90000" rIns="90000" tIns="45000" bIns="45000" anchor="ctr">
-            <a:noAutofit/>
-          </a:bodyPr>
-          <a:lstStyle>
-            <a:lvl1pPr indent="0" algn="ctr">
-              <a:lnSpc>
-                <a:spcPct val="100000"/>
-              </a:lnSpc>
-              <a:buNone/>
-              <a:tabLst>
-                <a:tab algn="l" pos="0"/>
-              </a:tabLst>
-              <a:defRPr b="1" lang="de-DE" sz="1100" spc="-1" strike="noStrike">
-                <a:solidFill>
-                  <a:srgbClr val="1d3c91"/>
-                </a:solidFill>
-                <a:latin typeface="Overpass"/>
-              </a:defRPr>
-            </a:lvl1pPr>
-          </a:lstStyle>
-          <a:p>
-            <a:pPr indent="0" algn="ctr">
-              <a:lnSpc>
-                <a:spcPct val="100000"/>
-              </a:lnSpc>
-              <a:buNone/>
-              <a:tabLst>
-                <a:tab algn="l" pos="0"/>
-              </a:tabLst>
-            </a:pPr>
-            <a:r>
-              <a:rPr b="1" lang="de-DE" sz="1100" spc="-1" strike="noStrike">
-                <a:solidFill>
-                  <a:srgbClr val="1d3c91"/>
-                </a:solidFill>
-                <a:latin typeface="Overpass"/>
-              </a:rPr>
-              <a:t>IPTW 2023 - 5./6. October 2023</a:t>
-            </a:r>
-            <a:endParaRPr b="0" lang="en-US" sz="1100" spc="-1" strike="noStrike">
-              <a:solidFill>
-                <a:srgbClr val="000000"/>
-              </a:solidFill>
-              <a:latin typeface="Times New Roman"/>
-            </a:endParaRPr>
-          </a:p>
-        </p:txBody>
-      </p:sp>
     </p:spTree>
   </p:cSld>
   <mc:AlternateContent>
@@ -5799,7 +5627,7 @@
       </p:grpSpPr>
       <p:sp>
         <p:nvSpPr>
-          <p:cNvPr id="79" name="PlaceHolder 1"/>
+          <p:cNvPr id="72" name="PlaceHolder 1"/>
           <p:cNvSpPr>
             <a:spLocks noGrp="1"/>
           </p:cNvSpPr>
@@ -5809,8 +5637,8 @@
         </p:nvSpPr>
         <p:spPr>
           <a:xfrm>
-            <a:off x="623160" y="4437000"/>
-            <a:ext cx="10513440" cy="541440"/>
+            <a:off x="623880" y="479880"/>
+            <a:ext cx="8067240" cy="609120"/>
           </a:xfrm>
           <a:prstGeom prst="rect">
             <a:avLst/>
@@ -5821,7 +5649,7 @@
           </a:ln>
         </p:spPr>
         <p:txBody>
-          <a:bodyPr lIns="0" rIns="0" tIns="0" bIns="0" anchor="t">
+          <a:bodyPr lIns="0" rIns="0" tIns="0" bIns="0" anchor="b">
             <a:noAutofit/>
           </a:bodyPr>
           <a:p>
@@ -5835,15 +5663,27 @@
               </a:tabLst>
             </a:pPr>
             <a:r>
-              <a:rPr b="1" lang="de-DE" sz="3300" spc="-1" strike="noStrike">
-                <a:solidFill>
-                  <a:srgbClr val="ffffff"/>
+              <a:rPr b="1" lang="de-DE" sz="2400" spc="-1" strike="noStrike">
+                <a:solidFill>
+                  <a:srgbClr val="1d3d91"/>
                 </a:solidFill>
                 <a:latin typeface="Overpass"/>
               </a:rPr>
-              <a:t>IPTW 2023</a:t>
-            </a:r>
-            <a:endParaRPr b="0" lang="en-US" sz="3300" spc="-1" strike="noStrike">
+              <a:t>Program </a:t>
+            </a:r>
+            <a:r>
+              <a:rPr b="1" lang="de-DE" sz="2400" spc="-1" strike="noStrike">
+                <a:solidFill>
+                  <a:srgbClr val="1d3d91"/>
+                </a:solidFill>
+                <a:latin typeface="Overpass"/>
+              </a:rPr>
+              <a:t>Day 2:</a:t>
+            </a:r>
+            <a:br>
+              <a:rPr sz="2400"/>
+            </a:br>
+            <a:endParaRPr b="0" lang="en-US" sz="2400" spc="-1" strike="noStrike">
               <a:solidFill>
                 <a:srgbClr val="000000"/>
               </a:solidFill>
@@ -5852,20 +5692,154 @@
           </a:p>
         </p:txBody>
       </p:sp>
-      <p:sp>
-        <p:nvSpPr>
-          <p:cNvPr id="80" name="PlaceHolder 2"/>
+      <p:pic>
+        <p:nvPicPr>
+          <p:cNvPr id="73" name="" descr=""/>
+          <p:cNvPicPr/>
+          <p:nvPr/>
+        </p:nvPicPr>
+        <p:blipFill>
+          <a:blip r:embed="rId1"/>
+          <a:stretch/>
+        </p:blipFill>
+        <p:spPr>
+          <a:xfrm>
+            <a:off x="900000" y="848160"/>
+            <a:ext cx="6117480" cy="5368680"/>
+          </a:xfrm>
+          <a:prstGeom prst="rect">
+            <a:avLst/>
+          </a:prstGeom>
+          <a:ln w="0">
+            <a:noFill/>
+          </a:ln>
+        </p:spPr>
+      </p:pic>
+      <p:sp>
+        <p:nvSpPr>
+          <p:cNvPr id="74" name="PlaceHolder 2"/>
           <p:cNvSpPr>
             <a:spLocks noGrp="1"/>
           </p:cNvSpPr>
           <p:nvPr>
-            <p:ph/>
+            <p:ph type="ftr" idx="10"/>
           </p:nvPr>
         </p:nvSpPr>
         <p:spPr>
           <a:xfrm>
-            <a:off x="623880" y="5419800"/>
-            <a:ext cx="7487640" cy="861840"/>
+            <a:off x="1981080" y="6344640"/>
+            <a:ext cx="8749800" cy="362160"/>
+          </a:xfrm>
+          <a:prstGeom prst="rect">
+            <a:avLst/>
+          </a:prstGeom>
+          <a:noFill/>
+          <a:ln w="0">
+            <a:noFill/>
+          </a:ln>
+        </p:spPr>
+        <p:txBody>
+          <a:bodyPr lIns="90000" rIns="90000" tIns="45000" bIns="45000" anchor="ctr">
+            <a:noAutofit/>
+          </a:bodyPr>
+          <a:lstStyle>
+            <a:lvl1pPr indent="0" algn="ctr">
+              <a:lnSpc>
+                <a:spcPct val="100000"/>
+              </a:lnSpc>
+              <a:buNone/>
+              <a:tabLst>
+                <a:tab algn="l" pos="0"/>
+              </a:tabLst>
+              <a:defRPr b="1" lang="de-DE" sz="1100" spc="-1" strike="noStrike">
+                <a:solidFill>
+                  <a:srgbClr val="1d3c91"/>
+                </a:solidFill>
+                <a:latin typeface="Overpass"/>
+              </a:defRPr>
+            </a:lvl1pPr>
+          </a:lstStyle>
+          <a:p>
+            <a:pPr indent="0" algn="ctr">
+              <a:lnSpc>
+                <a:spcPct val="100000"/>
+              </a:lnSpc>
+              <a:buNone/>
+              <a:tabLst>
+                <a:tab algn="l" pos="0"/>
+              </a:tabLst>
+            </a:pPr>
+            <a:r>
+              <a:rPr b="1" lang="de-DE" sz="1100" spc="-1" strike="noStrike">
+                <a:solidFill>
+                  <a:srgbClr val="1d3c91"/>
+                </a:solidFill>
+                <a:latin typeface="Overpass"/>
+              </a:rPr>
+              <a:t>IPTW 2023 - 5./6. </a:t>
+            </a:r>
+            <a:r>
+              <a:rPr b="1" lang="de-DE" sz="1100" spc="-1" strike="noStrike">
+                <a:solidFill>
+                  <a:srgbClr val="1d3c91"/>
+                </a:solidFill>
+                <a:latin typeface="Overpass"/>
+              </a:rPr>
+              <a:t>October 2023</a:t>
+            </a:r>
+            <a:endParaRPr b="0" lang="en-US" sz="1100" spc="-1" strike="noStrike">
+              <a:solidFill>
+                <a:srgbClr val="000000"/>
+              </a:solidFill>
+              <a:latin typeface="Times New Roman"/>
+            </a:endParaRPr>
+          </a:p>
+        </p:txBody>
+      </p:sp>
+    </p:spTree>
+  </p:cSld>
+  <mc:AlternateContent>
+    <mc:Choice Requires="p14">
+      <p:transition spd="slow" p14:dur="2000"/>
+    </mc:Choice>
+    <mc:Fallback>
+      <p:transition spd="slow"/>
+    </mc:Fallback>
+  </mc:AlternateContent>
+</p:sld>
+</file>
+
+<file path=ppt/slides/slide18.xml><?xml version="1.0" encoding="utf-8"?>
+<p:sld xmlns:a="http://schemas.openxmlformats.org/drawingml/2006/main" xmlns:p="http://schemas.openxmlformats.org/presentationml/2006/main" xmlns:r="http://schemas.openxmlformats.org/officeDocument/2006/relationships" xmlns:p14="http://schemas.microsoft.com/office/powerpoint/2010/main" xmlns:p15="http://schemas.microsoft.com/office/powerpoint/2012/main" xmlns:mc="http://schemas.openxmlformats.org/markup-compatibility/2006">
+  <p:cSld>
+    <p:spTree>
+      <p:nvGrpSpPr>
+        <p:cNvPr id="1" name=""/>
+        <p:cNvGrpSpPr/>
+        <p:nvPr/>
+      </p:nvGrpSpPr>
+      <p:grpSpPr>
+        <a:xfrm>
+          <a:off x="0" y="0"/>
+          <a:ext cx="0" cy="0"/>
+          <a:chOff x="0" y="0"/>
+          <a:chExt cx="0" cy="0"/>
+        </a:xfrm>
+      </p:grpSpPr>
+      <p:sp>
+        <p:nvSpPr>
+          <p:cNvPr id="75" name="PlaceHolder 1"/>
+          <p:cNvSpPr>
+            <a:spLocks noGrp="1"/>
+          </p:cNvSpPr>
+          <p:nvPr>
+            <p:ph type="title"/>
+          </p:nvPr>
+        </p:nvSpPr>
+        <p:spPr>
+          <a:xfrm>
+            <a:off x="623160" y="4437000"/>
+            <a:ext cx="10513080" cy="541080"/>
           </a:xfrm>
           <a:prstGeom prst="rect">
             <a:avLst/>
@@ -5890,6 +5864,70 @@
               </a:tabLst>
             </a:pPr>
             <a:r>
+              <a:rPr b="1" lang="de-DE" sz="3300" spc="-1" strike="noStrike">
+                <a:solidFill>
+                  <a:srgbClr val="ffffff"/>
+                </a:solidFill>
+                <a:latin typeface="Overpass"/>
+              </a:rPr>
+              <a:t>IPTW </a:t>
+            </a:r>
+            <a:r>
+              <a:rPr b="1" lang="de-DE" sz="3300" spc="-1" strike="noStrike">
+                <a:solidFill>
+                  <a:srgbClr val="ffffff"/>
+                </a:solidFill>
+                <a:latin typeface="Overpass"/>
+              </a:rPr>
+              <a:t>2023</a:t>
+            </a:r>
+            <a:endParaRPr b="0" lang="en-US" sz="3300" spc="-1" strike="noStrike">
+              <a:solidFill>
+                <a:srgbClr val="000000"/>
+              </a:solidFill>
+              <a:latin typeface="Arial"/>
+            </a:endParaRPr>
+          </a:p>
+        </p:txBody>
+      </p:sp>
+      <p:sp>
+        <p:nvSpPr>
+          <p:cNvPr id="76" name="PlaceHolder 2"/>
+          <p:cNvSpPr>
+            <a:spLocks noGrp="1"/>
+          </p:cNvSpPr>
+          <p:nvPr>
+            <p:ph/>
+          </p:nvPr>
+        </p:nvSpPr>
+        <p:spPr>
+          <a:xfrm>
+            <a:off x="623880" y="5419800"/>
+            <a:ext cx="7487280" cy="861480"/>
+          </a:xfrm>
+          <a:prstGeom prst="rect">
+            <a:avLst/>
+          </a:prstGeom>
+          <a:noFill/>
+          <a:ln w="0">
+            <a:noFill/>
+          </a:ln>
+        </p:spPr>
+        <p:txBody>
+          <a:bodyPr lIns="0" rIns="0" tIns="0" bIns="0" anchor="t">
+            <a:noAutofit/>
+          </a:bodyPr>
+          <a:p>
+            <a:pPr indent="0">
+              <a:lnSpc>
+                <a:spcPct val="90000"/>
+              </a:lnSpc>
+              <a:buNone/>
+              <a:tabLst>
+                <a:tab algn="l" pos="0"/>
+              </a:tabLst>
+            </a:pPr>
+            <a:r>
               <a:rPr b="1" lang="de-DE" sz="1800" spc="-1" strike="noStrike">
                 <a:solidFill>
                   <a:srgbClr val="ffffff"/>
@@ -5909,14 +5947,14 @@
       </p:sp>
       <p:sp>
         <p:nvSpPr>
-          <p:cNvPr id="81" name="Titel 1"/>
+          <p:cNvPr id="77" name="Titel 1"/>
           <p:cNvSpPr/>
           <p:nvPr/>
         </p:nvSpPr>
         <p:spPr>
           <a:xfrm>
             <a:off x="3600000" y="3164760"/>
-            <a:ext cx="7738200" cy="541440"/>
+            <a:ext cx="7737840" cy="541080"/>
           </a:xfrm>
           <a:prstGeom prst="rect">
             <a:avLst/>
@@ -6004,7 +6042,7 @@
         <p:spPr>
           <a:xfrm>
             <a:off x="623880" y="479880"/>
-            <a:ext cx="8067600" cy="609480"/>
+            <a:ext cx="8067240" cy="609120"/>
           </a:xfrm>
           <a:prstGeom prst="rect">
             <a:avLst/>
@@ -6035,7 +6073,52 @@
                 </a:solidFill>
                 <a:latin typeface="Overpass"/>
               </a:rPr>
-              <a:t>MPI-4.1: Nonblocking Communication Operations</a:t>
+              <a:t>MPI-4.1: </a:t>
+            </a:r>
+            <a:r>
+              <a:rPr b="1" lang="de-DE" sz="2400" spc="-1" strike="noStrike">
+                <a:solidFill>
+                  <a:srgbClr val="1d3d91"/>
+                </a:solidFill>
+                <a:latin typeface="Overpass"/>
+              </a:rPr>
+              <a:t>Nonblocki</a:t>
+            </a:r>
+            <a:r>
+              <a:rPr b="1" lang="de-DE" sz="2400" spc="-1" strike="noStrike">
+                <a:solidFill>
+                  <a:srgbClr val="1d3d91"/>
+                </a:solidFill>
+                <a:latin typeface="Overpass"/>
+              </a:rPr>
+              <a:t>ng </a:t>
+            </a:r>
+            <a:r>
+              <a:rPr b="1" lang="de-DE" sz="2400" spc="-1" strike="noStrike">
+                <a:solidFill>
+                  <a:srgbClr val="1d3d91"/>
+                </a:solidFill>
+                <a:latin typeface="Overpass"/>
+              </a:rPr>
+              <a:t>Communic</a:t>
+            </a:r>
+            <a:r>
+              <a:rPr b="1" lang="de-DE" sz="2400" spc="-1" strike="noStrike">
+                <a:solidFill>
+                  <a:srgbClr val="1d3d91"/>
+                </a:solidFill>
+                <a:latin typeface="Overpass"/>
+              </a:rPr>
+              <a:t>ation </a:t>
+            </a:r>
+            <a:r>
+              <a:rPr b="1" lang="de-DE" sz="2400" spc="-1" strike="noStrike">
+                <a:solidFill>
+                  <a:srgbClr val="1d3d91"/>
+                </a:solidFill>
+                <a:latin typeface="Overpass"/>
+              </a:rPr>
+              <a:t>Operations</a:t>
             </a:r>
             <a:endParaRPr b="0" lang="en-US" sz="2400" spc="-1" strike="noStrike">
               <a:solidFill>
@@ -6055,7 +6138,7 @@
         <p:spPr>
           <a:xfrm>
             <a:off x="685800" y="1371600"/>
-            <a:ext cx="10742760" cy="4570560"/>
+            <a:ext cx="10742400" cy="4570200"/>
           </a:xfrm>
           <a:prstGeom prst="rect">
             <a:avLst/>
@@ -6228,7 +6311,7 @@
         <p:spPr>
           <a:xfrm>
             <a:off x="1981080" y="6344640"/>
-            <a:ext cx="8750160" cy="362520"/>
+            <a:ext cx="8749800" cy="362160"/>
           </a:xfrm>
           <a:prstGeom prst="rect">
             <a:avLst/>
@@ -6298,7 +6381,7 @@
         <p:spPr>
           <a:xfrm>
             <a:off x="623880" y="479880"/>
-            <a:ext cx="8067600" cy="609480"/>
+            <a:ext cx="8067240" cy="609120"/>
           </a:xfrm>
           <a:prstGeom prst="rect">
             <a:avLst/>
@@ -6329,7 +6412,52 @@
                 </a:solidFill>
                 <a:latin typeface="Overpass"/>
               </a:rPr>
-              <a:t>MPI-4.1: Nonblocking Communication Operations</a:t>
+              <a:t>MPI-4.1: </a:t>
+            </a:r>
+            <a:r>
+              <a:rPr b="1" lang="de-DE" sz="2400" spc="-1" strike="noStrike">
+                <a:solidFill>
+                  <a:srgbClr val="1d3d91"/>
+                </a:solidFill>
+                <a:latin typeface="Overpass"/>
+              </a:rPr>
+              <a:t>Nonblocki</a:t>
+            </a:r>
+            <a:r>
+              <a:rPr b="1" lang="de-DE" sz="2400" spc="-1" strike="noStrike">
+                <a:solidFill>
+                  <a:srgbClr val="1d3d91"/>
+                </a:solidFill>
+                <a:latin typeface="Overpass"/>
+              </a:rPr>
+              <a:t>ng </a:t>
+            </a:r>
+            <a:r>
+              <a:rPr b="1" lang="de-DE" sz="2400" spc="-1" strike="noStrike">
+                <a:solidFill>
+                  <a:srgbClr val="1d3d91"/>
+                </a:solidFill>
+                <a:latin typeface="Overpass"/>
+              </a:rPr>
+              <a:t>Communic</a:t>
+            </a:r>
+            <a:r>
+              <a:rPr b="1" lang="de-DE" sz="2400" spc="-1" strike="noStrike">
+                <a:solidFill>
+                  <a:srgbClr val="1d3d91"/>
+                </a:solidFill>
+                <a:latin typeface="Overpass"/>
+              </a:rPr>
+              <a:t>ation </a:t>
+            </a:r>
+            <a:r>
+              <a:rPr b="1" lang="de-DE" sz="2400" spc="-1" strike="noStrike">
+                <a:solidFill>
+                  <a:srgbClr val="1d3d91"/>
+                </a:solidFill>
+                <a:latin typeface="Overpass"/>
+              </a:rPr>
+              <a:t>Operations</a:t>
             </a:r>
             <a:endParaRPr b="0" lang="en-US" sz="2400" spc="-1" strike="noStrike">
               <a:solidFill>
@@ -6349,7 +6477,7 @@
         <p:spPr>
           <a:xfrm>
             <a:off x="685800" y="1371600"/>
-            <a:ext cx="10742760" cy="4570560"/>
+            <a:ext cx="10742400" cy="4570200"/>
           </a:xfrm>
           <a:prstGeom prst="rect">
             <a:avLst/>
@@ -6439,30 +6567,7 @@
                 <a:latin typeface="Arial"/>
                 <a:ea typeface="DejaVu Sans"/>
               </a:rPr>
-              <a:t>The nonovertaking requirement of Section 3.5 is extended to nonblocking communication, with this definition of order being</a:t>
-            </a:r>
-            <a:endParaRPr b="0" lang="en-US" sz="1800" spc="-1" strike="noStrike">
-              <a:solidFill>
-                <a:srgbClr val="000000"/>
-              </a:solidFill>
-              <a:latin typeface="Arial"/>
-            </a:endParaRPr>
-          </a:p>
-          <a:p>
-            <a:pPr>
-              <a:lnSpc>
-                <a:spcPct val="100000"/>
-              </a:lnSpc>
-            </a:pPr>
-            <a:r>
-              <a:rPr b="0" lang="en-US" sz="1800" spc="-1" strike="noStrike">
-                <a:solidFill>
-                  <a:srgbClr val="000000"/>
-                </a:solidFill>
-                <a:latin typeface="Arial"/>
-                <a:ea typeface="DejaVu Sans"/>
-              </a:rPr>
-              <a:t>used.</a:t>
+              <a:t>The nonovertaking requirement of Section 3.5 is extended to nonblocking communication, with this definition of order being used.</a:t>
             </a:r>
             <a:endParaRPr b="0" lang="en-US" sz="1800" spc="-1" strike="noStrike">
               <a:solidFill>
@@ -6486,7 +6591,7 @@
         <p:spPr>
           <a:xfrm>
             <a:off x="1981080" y="6344640"/>
-            <a:ext cx="8750160" cy="362520"/>
+            <a:ext cx="8749800" cy="362160"/>
           </a:xfrm>
           <a:prstGeom prst="rect">
             <a:avLst/>
@@ -6556,7 +6661,7 @@
         <p:spPr>
           <a:xfrm>
             <a:off x="623880" y="479880"/>
-            <a:ext cx="8067600" cy="609480"/>
+            <a:ext cx="8067240" cy="609120"/>
           </a:xfrm>
           <a:prstGeom prst="rect">
             <a:avLst/>
@@ -6587,7 +6692,43 @@
                 </a:solidFill>
                 <a:latin typeface="Overpass"/>
               </a:rPr>
-              <a:t>MPI-4.1: Partitioned Communication</a:t>
+              <a:t>MPI-4.1: </a:t>
+            </a:r>
+            <a:r>
+              <a:rPr b="1" lang="de-DE" sz="2400" spc="-1" strike="noStrike">
+                <a:solidFill>
+                  <a:srgbClr val="1d3d91"/>
+                </a:solidFill>
+                <a:latin typeface="Overpass"/>
+              </a:rPr>
+              <a:t>Partitione</a:t>
+            </a:r>
+            <a:r>
+              <a:rPr b="1" lang="de-DE" sz="2400" spc="-1" strike="noStrike">
+                <a:solidFill>
+                  <a:srgbClr val="1d3d91"/>
+                </a:solidFill>
+                <a:latin typeface="Overpass"/>
+              </a:rPr>
+              <a:t>d </a:t>
+            </a:r>
+            <a:r>
+              <a:rPr b="1" lang="de-DE" sz="2400" spc="-1" strike="noStrike">
+                <a:solidFill>
+                  <a:srgbClr val="1d3d91"/>
+                </a:solidFill>
+                <a:latin typeface="Overpass"/>
+              </a:rPr>
+              <a:t>Communic</a:t>
+            </a:r>
+            <a:r>
+              <a:rPr b="1" lang="de-DE" sz="2400" spc="-1" strike="noStrike">
+                <a:solidFill>
+                  <a:srgbClr val="1d3d91"/>
+                </a:solidFill>
+                <a:latin typeface="Overpass"/>
+              </a:rPr>
+              <a:t>ation</a:t>
             </a:r>
             <a:endParaRPr b="0" lang="en-US" sz="2400" spc="-1" strike="noStrike">
               <a:solidFill>
@@ -6607,7 +6748,7 @@
         <p:spPr>
           <a:xfrm>
             <a:off x="685800" y="1371600"/>
-            <a:ext cx="10742760" cy="4570560"/>
+            <a:ext cx="10742400" cy="4570200"/>
           </a:xfrm>
           <a:prstGeom prst="rect">
             <a:avLst/>
@@ -6823,7 +6964,7 @@
         <p:spPr>
           <a:xfrm>
             <a:off x="1981080" y="6344640"/>
-            <a:ext cx="8750160" cy="362520"/>
+            <a:ext cx="8749800" cy="362160"/>
           </a:xfrm>
           <a:prstGeom prst="rect">
             <a:avLst/>
@@ -6871,7 +7012,16 @@
                 </a:solidFill>
                 <a:latin typeface="Overpass"/>
               </a:rPr>
-              <a:t>IPTW 2023 - 5./6. October 2023</a:t>
+              <a:t>IPTW 2023 - 5./6. </a:t>
+            </a:r>
+            <a:r>
+              <a:rPr b="1" lang="de-DE" sz="1100" spc="-1" strike="noStrike">
+                <a:solidFill>
+                  <a:srgbClr val="1d3c91"/>
+                </a:solidFill>
+                <a:latin typeface="Overpass"/>
+              </a:rPr>
+              <a:t>October 2023</a:t>
             </a:r>
             <a:endParaRPr b="0" lang="en-US" sz="1100" spc="-1" strike="noStrike">
               <a:solidFill>
@@ -6921,7 +7071,7 @@
         <p:spPr>
           <a:xfrm>
             <a:off x="685800" y="1371600"/>
-            <a:ext cx="10742760" cy="4570560"/>
+            <a:ext cx="10742400" cy="4570200"/>
           </a:xfrm>
           <a:prstGeom prst="rect">
             <a:avLst/>
@@ -7105,7 +7255,7 @@
         <p:spPr>
           <a:xfrm>
             <a:off x="624240" y="479880"/>
-            <a:ext cx="8067600" cy="609480"/>
+            <a:ext cx="8067240" cy="609120"/>
           </a:xfrm>
           <a:prstGeom prst="rect">
             <a:avLst/>
@@ -7192,7 +7342,7 @@
         <p:spPr>
           <a:xfrm>
             <a:off x="685800" y="1371600"/>
-            <a:ext cx="10742760" cy="4570560"/>
+            <a:ext cx="10742400" cy="4570200"/>
           </a:xfrm>
           <a:prstGeom prst="rect">
             <a:avLst/>
@@ -7259,7 +7409,7 @@
                 <a:latin typeface="Arial"/>
                 <a:ea typeface="DejaVu Sans"/>
               </a:rPr>
-              <a:t>No overlap</a:t>
+              <a:t>No early-bird-gain or overlap with computation</a:t>
             </a:r>
             <a:endParaRPr b="0" lang="en-US" sz="1800" spc="-1" strike="noStrike">
               <a:solidFill>
@@ -7292,7 +7442,7 @@
         <p:spPr>
           <a:xfrm>
             <a:off x="624240" y="479880"/>
-            <a:ext cx="8067600" cy="609480"/>
+            <a:ext cx="8067240" cy="609120"/>
           </a:xfrm>
           <a:prstGeom prst="rect">
             <a:avLst/>
@@ -7349,7 +7499,7 @@
         <p:spPr>
           <a:xfrm>
             <a:off x="1230840" y="1757160"/>
-            <a:ext cx="7443720" cy="243360"/>
+            <a:ext cx="7443360" cy="243000"/>
           </a:xfrm>
           <a:prstGeom prst="rect">
             <a:avLst/>
@@ -7424,7 +7574,7 @@
         <p:spPr>
           <a:xfrm>
             <a:off x="685800" y="1371600"/>
-            <a:ext cx="10742760" cy="4570560"/>
+            <a:ext cx="10742400" cy="4570200"/>
           </a:xfrm>
           <a:prstGeom prst="rect">
             <a:avLst/>
@@ -7469,7 +7619,7 @@
         <p:spPr>
           <a:xfrm>
             <a:off x="624240" y="479880"/>
-            <a:ext cx="8067600" cy="609480"/>
+            <a:ext cx="8067240" cy="609120"/>
           </a:xfrm>
           <a:prstGeom prst="rect">
             <a:avLst/>
@@ -7519,86 +7669,14 @@
       </p:sp>
       <p:sp>
         <p:nvSpPr>
-          <p:cNvPr id="41" name="PlaceHolder 1"/>
-          <p:cNvSpPr>
-            <a:spLocks noGrp="1"/>
-          </p:cNvSpPr>
-          <p:nvPr>
-            <p:ph type="ftr" idx="10"/>
-          </p:nvPr>
-        </p:nvSpPr>
-        <p:spPr>
-          <a:xfrm>
-            <a:off x="1981080" y="6344640"/>
-            <a:ext cx="8750160" cy="362520"/>
-          </a:xfrm>
-          <a:prstGeom prst="rect">
-            <a:avLst/>
-          </a:prstGeom>
-          <a:noFill/>
-          <a:ln w="0">
-            <a:noFill/>
-          </a:ln>
-        </p:spPr>
-        <p:txBody>
-          <a:bodyPr lIns="90000" rIns="90000" tIns="45000" bIns="45000" anchor="ctr">
-            <a:noAutofit/>
-          </a:bodyPr>
-          <a:lstStyle>
-            <a:lvl1pPr indent="0" algn="ctr">
-              <a:lnSpc>
-                <a:spcPct val="100000"/>
-              </a:lnSpc>
-              <a:buNone/>
-              <a:tabLst>
-                <a:tab algn="l" pos="0"/>
-              </a:tabLst>
-              <a:defRPr b="1" lang="de-DE" sz="1100" spc="-1" strike="noStrike">
-                <a:solidFill>
-                  <a:srgbClr val="1d3c91"/>
-                </a:solidFill>
-                <a:latin typeface="Overpass"/>
-              </a:defRPr>
-            </a:lvl1pPr>
-          </a:lstStyle>
-          <a:p>
-            <a:pPr indent="0" algn="ctr">
-              <a:lnSpc>
-                <a:spcPct val="100000"/>
-              </a:lnSpc>
-              <a:buNone/>
-              <a:tabLst>
-                <a:tab algn="l" pos="0"/>
-              </a:tabLst>
-            </a:pPr>
-            <a:r>
-              <a:rPr b="1" lang="de-DE" sz="1100" spc="-1" strike="noStrike">
-                <a:solidFill>
-                  <a:srgbClr val="1d3c91"/>
-                </a:solidFill>
-                <a:latin typeface="Overpass"/>
-              </a:rPr>
-              <a:t>IPTW 2023 - 5./6. October 2023</a:t>
-            </a:r>
-            <a:endParaRPr b="0" lang="en-US" sz="1100" spc="-1" strike="noStrike">
-              <a:solidFill>
-                <a:srgbClr val="000000"/>
-              </a:solidFill>
-              <a:latin typeface="Times New Roman"/>
-            </a:endParaRPr>
-          </a:p>
-        </p:txBody>
-      </p:sp>
-      <p:sp>
-        <p:nvSpPr>
-          <p:cNvPr id="42" name=""/>
+          <p:cNvPr id="41" name=""/>
           <p:cNvSpPr/>
           <p:nvPr/>
         </p:nvSpPr>
         <p:spPr>
           <a:xfrm>
             <a:off x="1230840" y="1757160"/>
-            <a:ext cx="7443720" cy="243360"/>
+            <a:ext cx="7443360" cy="243000"/>
           </a:xfrm>
           <a:prstGeom prst="rect">
             <a:avLst/>
@@ -7636,14 +7714,14 @@
       </p:sp>
       <p:sp>
         <p:nvSpPr>
-          <p:cNvPr id="43" name=""/>
+          <p:cNvPr id="42" name=""/>
           <p:cNvSpPr/>
           <p:nvPr/>
         </p:nvSpPr>
         <p:spPr>
           <a:xfrm>
             <a:off x="838080" y="1523880"/>
-            <a:ext cx="10742760" cy="4570560"/>
+            <a:ext cx="10742400" cy="4570200"/>
           </a:xfrm>
           <a:prstGeom prst="rect">
             <a:avLst/>
@@ -7822,14 +7900,14 @@
       </p:grpSpPr>
       <p:sp>
         <p:nvSpPr>
-          <p:cNvPr id="44" name=""/>
+          <p:cNvPr id="43" name=""/>
           <p:cNvSpPr/>
           <p:nvPr/>
         </p:nvSpPr>
         <p:spPr>
           <a:xfrm>
             <a:off x="685800" y="1371600"/>
-            <a:ext cx="10742760" cy="4570560"/>
+            <a:ext cx="10742400" cy="4570200"/>
           </a:xfrm>
           <a:prstGeom prst="rect">
             <a:avLst/>
@@ -7867,14 +7945,14 @@
       </p:sp>
       <p:sp>
         <p:nvSpPr>
-          <p:cNvPr id="45" name="PlaceHolder 3"/>
+          <p:cNvPr id="44" name="PlaceHolder 3"/>
           <p:cNvSpPr/>
           <p:nvPr/>
         </p:nvSpPr>
         <p:spPr>
           <a:xfrm>
             <a:off x="624240" y="479880"/>
-            <a:ext cx="8067600" cy="609480"/>
+            <a:ext cx="8067240" cy="609120"/>
           </a:xfrm>
           <a:prstGeom prst="rect">
             <a:avLst/>
@@ -7924,14 +8002,14 @@
       </p:sp>
       <p:sp>
         <p:nvSpPr>
-          <p:cNvPr id="46" name=""/>
+          <p:cNvPr id="45" name=""/>
           <p:cNvSpPr/>
           <p:nvPr/>
         </p:nvSpPr>
         <p:spPr>
           <a:xfrm>
             <a:off x="1230840" y="1757160"/>
-            <a:ext cx="7443720" cy="243360"/>
+            <a:ext cx="7443360" cy="243000"/>
           </a:xfrm>
           <a:prstGeom prst="rect">
             <a:avLst/>
@@ -7969,14 +8047,14 @@
       </p:sp>
       <p:sp>
         <p:nvSpPr>
-          <p:cNvPr id="47" name=""/>
+          <p:cNvPr id="46" name=""/>
           <p:cNvSpPr/>
           <p:nvPr/>
         </p:nvSpPr>
         <p:spPr>
           <a:xfrm>
             <a:off x="838080" y="1523880"/>
-            <a:ext cx="10742760" cy="4570560"/>
+            <a:ext cx="10742400" cy="4570200"/>
           </a:xfrm>
           <a:prstGeom prst="rect">
             <a:avLst/>
@@ -8461,14 +8539,14 @@
       </p:grpSpPr>
       <p:sp>
         <p:nvSpPr>
-          <p:cNvPr id="48" name=""/>
+          <p:cNvPr id="47" name=""/>
           <p:cNvSpPr/>
           <p:nvPr/>
         </p:nvSpPr>
         <p:spPr>
           <a:xfrm>
             <a:off x="685800" y="1371600"/>
-            <a:ext cx="10742760" cy="4570560"/>
+            <a:ext cx="10742400" cy="4570200"/>
           </a:xfrm>
           <a:prstGeom prst="rect">
             <a:avLst/>
@@ -8506,14 +8584,14 @@
       </p:sp>
       <p:sp>
         <p:nvSpPr>
-          <p:cNvPr id="49" name="PlaceHolder 3"/>
+          <p:cNvPr id="48" name="PlaceHolder 3"/>
           <p:cNvSpPr/>
           <p:nvPr/>
         </p:nvSpPr>
         <p:spPr>
           <a:xfrm>
             <a:off x="624240" y="479880"/>
-            <a:ext cx="8067600" cy="609480"/>
+            <a:ext cx="8067240" cy="609120"/>
           </a:xfrm>
           <a:prstGeom prst="rect">
             <a:avLst/>
@@ -8563,86 +8641,14 @@
       </p:sp>
       <p:sp>
         <p:nvSpPr>
-          <p:cNvPr id="50" name="PlaceHolder 1"/>
-          <p:cNvSpPr>
-            <a:spLocks noGrp="1"/>
-          </p:cNvSpPr>
-          <p:nvPr>
-            <p:ph type="ftr" idx="11"/>
-          </p:nvPr>
-        </p:nvSpPr>
-        <p:spPr>
-          <a:xfrm>
-            <a:off x="1981080" y="6344640"/>
-            <a:ext cx="8750160" cy="362520"/>
-          </a:xfrm>
-          <a:prstGeom prst="rect">
-            <a:avLst/>
-          </a:prstGeom>
-          <a:noFill/>
-          <a:ln w="0">
-            <a:noFill/>
-          </a:ln>
-        </p:spPr>
-        <p:txBody>
-          <a:bodyPr lIns="90000" rIns="90000" tIns="45000" bIns="45000" anchor="ctr">
-            <a:noAutofit/>
-          </a:bodyPr>
-          <a:lstStyle>
-            <a:lvl1pPr indent="0" algn="ctr">
-              <a:lnSpc>
-                <a:spcPct val="100000"/>
-              </a:lnSpc>
-              <a:buNone/>
-              <a:tabLst>
-                <a:tab algn="l" pos="0"/>
-              </a:tabLst>
-              <a:defRPr b="1" lang="de-DE" sz="1100" spc="-1" strike="noStrike">
-                <a:solidFill>
-                  <a:srgbClr val="1d3c91"/>
-                </a:solidFill>
-                <a:latin typeface="Overpass"/>
-              </a:defRPr>
-            </a:lvl1pPr>
-          </a:lstStyle>
-          <a:p>
-            <a:pPr indent="0" algn="ctr">
-              <a:lnSpc>
-                <a:spcPct val="100000"/>
-              </a:lnSpc>
-              <a:buNone/>
-              <a:tabLst>
-                <a:tab algn="l" pos="0"/>
-              </a:tabLst>
-            </a:pPr>
-            <a:r>
-              <a:rPr b="1" lang="de-DE" sz="1100" spc="-1" strike="noStrike">
-                <a:solidFill>
-                  <a:srgbClr val="1d3c91"/>
-                </a:solidFill>
-                <a:latin typeface="Overpass"/>
-              </a:rPr>
-              <a:t>IPTW 2023 - 5./6. October 2023</a:t>
-            </a:r>
-            <a:endParaRPr b="0" lang="en-US" sz="1100" spc="-1" strike="noStrike">
-              <a:solidFill>
-                <a:srgbClr val="000000"/>
-              </a:solidFill>
-              <a:latin typeface="Times New Roman"/>
-            </a:endParaRPr>
-          </a:p>
-        </p:txBody>
-      </p:sp>
-      <p:sp>
-        <p:nvSpPr>
-          <p:cNvPr id="51" name=""/>
+          <p:cNvPr id="49" name=""/>
           <p:cNvSpPr/>
           <p:nvPr/>
         </p:nvSpPr>
         <p:spPr>
           <a:xfrm>
             <a:off x="1230840" y="1757160"/>
-            <a:ext cx="7443720" cy="243360"/>
+            <a:ext cx="7443360" cy="243000"/>
           </a:xfrm>
           <a:prstGeom prst="rect">
             <a:avLst/>
@@ -8680,13 +8686,13 @@
       </p:sp>
       <p:graphicFrame>
         <p:nvGraphicFramePr>
-          <p:cNvPr id="52" name=""/>
+          <p:cNvPr id="50" name=""/>
           <p:cNvGraphicFramePr/>
           <p:nvPr/>
         </p:nvGraphicFramePr>
         <p:xfrm>
           <a:off x="898560" y="1427400"/>
-          <a:ext cx="10531440" cy="4322160"/>
+          <a:ext cx="10711800" cy="4187520"/>
         </p:xfrm>
         <a:graphic>
           <a:graphicData uri="http://schemas.openxmlformats.org/drawingml/2006/table">
@@ -8702,10 +8708,15 @@
               <a:tr h="343440">
                 <a:tc>
                   <a:txBody>
-                    <a:bodyPr lIns="36000" rIns="36000" tIns="36000" bIns="36000" anchor="t">
+                    <a:bodyPr lIns="36000" rIns="36000" anchor="t">
                       <a:noAutofit/>
                     </a:bodyPr>
                     <a:p>
+                      <a:pPr>
+                        <a:lnSpc>
+                          <a:spcPct val="100000"/>
+                        </a:lnSpc>
+                      </a:pPr>
                       <a:r>
                         <a:rPr b="0" lang="en-US" sz="1800" spc="-1" strike="noStrike">
                           <a:solidFill>
@@ -8753,10 +8764,15 @@
                 </a:tc>
                 <a:tc>
                   <a:txBody>
-                    <a:bodyPr lIns="36000" rIns="36000" tIns="36000" bIns="36000" anchor="t">
+                    <a:bodyPr lIns="36000" rIns="36000" anchor="t">
                       <a:noAutofit/>
                     </a:bodyPr>
                     <a:p>
+                      <a:pPr>
+                        <a:lnSpc>
+                          <a:spcPct val="100000"/>
+                        </a:lnSpc>
+                      </a:pPr>
                       <a:r>
                         <a:rPr b="0" lang="en-US" sz="1800" spc="-1" strike="noStrike">
                           <a:solidFill>
@@ -8804,10 +8820,15 @@
                 </a:tc>
                 <a:tc>
                   <a:txBody>
-                    <a:bodyPr lIns="36000" rIns="36000" tIns="36000" bIns="36000" anchor="t">
+                    <a:bodyPr lIns="36000" rIns="36000" anchor="t">
                       <a:noAutofit/>
                     </a:bodyPr>
                     <a:p>
+                      <a:pPr>
+                        <a:lnSpc>
+                          <a:spcPct val="100000"/>
+                        </a:lnSpc>
+                      </a:pPr>
                       <a:r>
                         <a:rPr b="0" lang="en-US" sz="1800" spc="-1" strike="noStrike">
                           <a:solidFill>
@@ -8855,10 +8876,15 @@
                 </a:tc>
                 <a:tc>
                   <a:txBody>
-                    <a:bodyPr lIns="36000" rIns="36000" tIns="36000" bIns="36000" anchor="t">
+                    <a:bodyPr lIns="36000" rIns="36000" anchor="t">
                       <a:noAutofit/>
                     </a:bodyPr>
                     <a:p>
+                      <a:pPr>
+                        <a:lnSpc>
+                          <a:spcPct val="100000"/>
+                        </a:lnSpc>
+                      </a:pPr>
                       <a:r>
                         <a:rPr b="0" lang="en-US" sz="1800" spc="-1" strike="noStrike">
                           <a:solidFill>
@@ -8906,7 +8932,7 @@
                 </a:tc>
                 <a:tc>
                   <a:txBody>
-                    <a:bodyPr lIns="36000" rIns="36000" tIns="36000" bIns="36000" anchor="t">
+                    <a:bodyPr lIns="36000" rIns="36000" anchor="t">
                       <a:noAutofit/>
                     </a:bodyPr>
                     <a:p>
@@ -8950,7 +8976,7 @@
               <a:tr h="364680">
                 <a:tc>
                   <a:txBody>
-                    <a:bodyPr lIns="36000" rIns="36000" tIns="36000" bIns="36000" anchor="t">
+                    <a:bodyPr lIns="36000" rIns="36000" anchor="t">
                       <a:noAutofit/>
                     </a:bodyPr>
                     <a:p>
@@ -8992,7 +9018,7 @@
                 </a:tc>
                 <a:tc>
                   <a:txBody>
-                    <a:bodyPr lIns="36000" rIns="36000" tIns="36000" bIns="36000" anchor="t">
+                    <a:bodyPr lIns="36000" rIns="36000" anchor="t">
                       <a:noAutofit/>
                     </a:bodyPr>
                     <a:p>
@@ -9034,10 +9060,15 @@
                 </a:tc>
                 <a:tc>
                   <a:txBody>
-                    <a:bodyPr lIns="36000" rIns="36000" tIns="36000" bIns="36000" anchor="t">
+                    <a:bodyPr lIns="36000" rIns="36000" anchor="t">
                       <a:noAutofit/>
                     </a:bodyPr>
                     <a:p>
+                      <a:pPr>
+                        <a:lnSpc>
+                          <a:spcPct val="100000"/>
+                        </a:lnSpc>
+                      </a:pPr>
                       <a:r>
                         <a:rPr b="0" lang="en-US" sz="1800" spc="-1" strike="noStrike">
                           <a:solidFill>
@@ -9085,7 +9116,7 @@
                 </a:tc>
                 <a:tc>
                   <a:txBody>
-                    <a:bodyPr lIns="36000" rIns="36000" tIns="36000" bIns="36000" anchor="t">
+                    <a:bodyPr lIns="36000" rIns="36000" anchor="t">
                       <a:noAutofit/>
                     </a:bodyPr>
                     <a:p>
@@ -9127,7 +9158,7 @@
                 </a:tc>
                 <a:tc>
                   <a:txBody>
-                    <a:bodyPr lIns="36000" rIns="36000" tIns="36000" bIns="36000" anchor="t">
+                    <a:bodyPr lIns="36000" rIns="36000" anchor="t">
                       <a:noAutofit/>
                     </a:bodyPr>
                     <a:p>
@@ -9171,7 +9202,7 @@
               <a:tr h="364680">
                 <a:tc>
                   <a:txBody>
-                    <a:bodyPr lIns="36000" rIns="36000" tIns="36000" bIns="36000" anchor="t">
+                    <a:bodyPr lIns="36000" rIns="36000" anchor="t">
                       <a:noAutofit/>
                     </a:bodyPr>
                     <a:p>
@@ -9213,10 +9244,15 @@
                 </a:tc>
                 <a:tc>
                   <a:txBody>
-                    <a:bodyPr lIns="36000" rIns="36000" tIns="36000" bIns="36000" anchor="t">
+                    <a:bodyPr lIns="36000" rIns="36000" anchor="t">
                       <a:noAutofit/>
                     </a:bodyPr>
                     <a:p>
+                      <a:pPr>
+                        <a:lnSpc>
+                          <a:spcPct val="100000"/>
+                        </a:lnSpc>
+                      </a:pPr>
                       <a:r>
                         <a:rPr b="0" lang="en-US" sz="1800" spc="-1" strike="noStrike">
                           <a:solidFill>
@@ -9264,10 +9300,15 @@
                 </a:tc>
                 <a:tc>
                   <a:txBody>
-                    <a:bodyPr lIns="36000" rIns="36000" tIns="36000" bIns="36000" anchor="t">
+                    <a:bodyPr lIns="36000" rIns="36000" anchor="t">
                       <a:noAutofit/>
                     </a:bodyPr>
                     <a:p>
+                      <a:pPr>
+                        <a:lnSpc>
+                          <a:spcPct val="100000"/>
+                        </a:lnSpc>
+                      </a:pPr>
                       <a:r>
                         <a:rPr b="0" lang="en-US" sz="1800" spc="-1" strike="noStrike">
                           <a:solidFill>
@@ -9315,10 +9356,15 @@
                 </a:tc>
                 <a:tc>
                   <a:txBody>
-                    <a:bodyPr lIns="36000" rIns="36000" tIns="36000" bIns="36000" anchor="t">
+                    <a:bodyPr lIns="36000" rIns="36000" anchor="t">
                       <a:noAutofit/>
                     </a:bodyPr>
                     <a:p>
+                      <a:pPr>
+                        <a:lnSpc>
+                          <a:spcPct val="100000"/>
+                        </a:lnSpc>
+                      </a:pPr>
                       <a:r>
                         <a:rPr b="0" lang="en-US" sz="1800" spc="-1" strike="noStrike">
                           <a:solidFill>
@@ -9366,7 +9412,7 @@
                 </a:tc>
                 <a:tc>
                   <a:txBody>
-                    <a:bodyPr lIns="36000" rIns="36000" tIns="36000" bIns="36000" anchor="t">
+                    <a:bodyPr lIns="36000" rIns="36000" anchor="t">
                       <a:noAutofit/>
                     </a:bodyPr>
                     <a:p>
@@ -9410,7 +9456,7 @@
               <a:tr h="0">
                 <a:tc>
                   <a:txBody>
-                    <a:bodyPr lIns="36000" rIns="36000" tIns="36000" bIns="36000" anchor="t">
+                    <a:bodyPr lIns="36000" rIns="36000" anchor="t">
                       <a:noAutofit/>
                     </a:bodyPr>
                     <a:p>
@@ -9452,7 +9498,7 @@
                 </a:tc>
                 <a:tc>
                   <a:txBody>
-                    <a:bodyPr lIns="36000" rIns="36000" tIns="36000" bIns="36000" anchor="t">
+                    <a:bodyPr lIns="36000" rIns="36000" anchor="t">
                       <a:noAutofit/>
                     </a:bodyPr>
                     <a:p>
@@ -9494,10 +9540,15 @@
                 </a:tc>
                 <a:tc>
                   <a:txBody>
-                    <a:bodyPr lIns="36000" rIns="36000" tIns="36000" bIns="36000" anchor="t">
+                    <a:bodyPr lIns="36000" rIns="36000" anchor="t">
                       <a:noAutofit/>
                     </a:bodyPr>
                     <a:p>
+                      <a:pPr>
+                        <a:lnSpc>
+                          <a:spcPct val="100000"/>
+                        </a:lnSpc>
+                      </a:pPr>
                       <a:r>
                         <a:rPr b="0" lang="en-US" sz="1800" spc="-1" strike="noStrike">
                           <a:solidFill>
@@ -9545,10 +9596,15 @@
                 </a:tc>
                 <a:tc>
                   <a:txBody>
-                    <a:bodyPr lIns="36000" rIns="36000" tIns="36000" bIns="36000" anchor="t">
+                    <a:bodyPr lIns="36000" rIns="36000" anchor="t">
                       <a:noAutofit/>
                     </a:bodyPr>
                     <a:p>
+                      <a:pPr>
+                        <a:lnSpc>
+                          <a:spcPct val="100000"/>
+                        </a:lnSpc>
+                      </a:pPr>
                       <a:r>
                         <a:rPr b="0" lang="en-US" sz="1800" spc="-1" strike="noStrike">
                           <a:solidFill>
@@ -9596,7 +9652,7 @@
                 </a:tc>
                 <a:tc>
                   <a:txBody>
-                    <a:bodyPr lIns="36000" rIns="36000" tIns="36000" bIns="36000" anchor="t">
+                    <a:bodyPr lIns="36000" rIns="36000" anchor="t">
                       <a:noAutofit/>
                     </a:bodyPr>
                     <a:p>
@@ -9640,7 +9696,7 @@
               <a:tr h="0">
                 <a:tc>
                   <a:txBody>
-                    <a:bodyPr lIns="36000" rIns="36000" tIns="36000" bIns="36000" anchor="t">
+                    <a:bodyPr lIns="36000" rIns="36000" anchor="t">
                       <a:noAutofit/>
                     </a:bodyPr>
                     <a:p>
@@ -9682,10 +9738,15 @@
                 </a:tc>
                 <a:tc>
                   <a:txBody>
-                    <a:bodyPr lIns="36000" rIns="36000" tIns="36000" bIns="36000" anchor="t">
+                    <a:bodyPr lIns="36000" rIns="36000" anchor="t">
                       <a:noAutofit/>
                     </a:bodyPr>
                     <a:p>
+                      <a:pPr>
+                        <a:lnSpc>
+                          <a:spcPct val="100000"/>
+                        </a:lnSpc>
+                      </a:pPr>
                       <a:r>
                         <a:rPr b="0" lang="en-US" sz="1800" spc="-1" strike="noStrike">
                           <a:solidFill>
@@ -9733,10 +9794,15 @@
                 </a:tc>
                 <a:tc>
                   <a:txBody>
-                    <a:bodyPr lIns="36000" rIns="36000" tIns="36000" bIns="36000" anchor="t">
+                    <a:bodyPr lIns="36000" rIns="36000" anchor="t">
                       <a:noAutofit/>
                     </a:bodyPr>
                     <a:p>
+                      <a:pPr>
+                        <a:lnSpc>
+                          <a:spcPct val="100000"/>
+                        </a:lnSpc>
+                      </a:pPr>
                       <a:r>
                         <a:rPr b="0" lang="en-US" sz="1800" spc="-1" strike="noStrike">
                           <a:solidFill>
@@ -9784,10 +9850,15 @@
                 </a:tc>
                 <a:tc>
                   <a:txBody>
-                    <a:bodyPr lIns="36000" rIns="36000" tIns="36000" bIns="36000" anchor="t">
+                    <a:bodyPr lIns="36000" rIns="36000" anchor="t">
                       <a:noAutofit/>
                     </a:bodyPr>
                     <a:p>
+                      <a:pPr>
+                        <a:lnSpc>
+                          <a:spcPct val="100000"/>
+                        </a:lnSpc>
+                      </a:pPr>
                       <a:r>
                         <a:rPr b="0" lang="en-US" sz="1800" spc="-1" strike="noStrike">
                           <a:solidFill>
@@ -9835,7 +9906,7 @@
                 </a:tc>
                 <a:tc>
                   <a:txBody>
-                    <a:bodyPr lIns="36000" rIns="36000" tIns="36000" bIns="36000" anchor="t">
+                    <a:bodyPr lIns="36000" rIns="36000" anchor="t">
                       <a:noAutofit/>
                     </a:bodyPr>
                     <a:p>
@@ -9879,7 +9950,7 @@
               <a:tr h="0">
                 <a:tc>
                   <a:txBody>
-                    <a:bodyPr lIns="36000" rIns="36000" tIns="36000" bIns="36000" anchor="t">
+                    <a:bodyPr lIns="36000" rIns="36000" anchor="t">
                       <a:noAutofit/>
                     </a:bodyPr>
                     <a:p>
@@ -9921,10 +9992,15 @@
                 </a:tc>
                 <a:tc>
                   <a:txBody>
-                    <a:bodyPr lIns="36000" rIns="36000" tIns="36000" bIns="36000" anchor="t">
+                    <a:bodyPr lIns="36000" rIns="36000" anchor="t">
                       <a:noAutofit/>
                     </a:bodyPr>
                     <a:p>
+                      <a:pPr>
+                        <a:lnSpc>
+                          <a:spcPct val="100000"/>
+                        </a:lnSpc>
+                      </a:pPr>
                       <a:r>
                         <a:rPr b="0" lang="en-US" sz="1800" spc="-1" strike="noStrike">
                           <a:solidFill>
@@ -9972,10 +10048,15 @@
                 </a:tc>
                 <a:tc>
                   <a:txBody>
-                    <a:bodyPr lIns="36000" rIns="36000" tIns="36000" bIns="36000" anchor="t">
+                    <a:bodyPr lIns="36000" rIns="36000" anchor="t">
                       <a:noAutofit/>
                     </a:bodyPr>
                     <a:p>
+                      <a:pPr>
+                        <a:lnSpc>
+                          <a:spcPct val="100000"/>
+                        </a:lnSpc>
+                      </a:pPr>
                       <a:r>
                         <a:rPr b="0" lang="en-US" sz="1800" spc="-1" strike="noStrike">
                           <a:solidFill>
@@ -10023,10 +10104,15 @@
                 </a:tc>
                 <a:tc>
                   <a:txBody>
-                    <a:bodyPr lIns="36000" rIns="36000" tIns="36000" bIns="36000" anchor="t">
+                    <a:bodyPr lIns="36000" rIns="36000" anchor="t">
                       <a:noAutofit/>
                     </a:bodyPr>
                     <a:p>
+                      <a:pPr>
+                        <a:lnSpc>
+                          <a:spcPct val="100000"/>
+                        </a:lnSpc>
+                      </a:pPr>
                       <a:r>
                         <a:rPr b="0" lang="en-US" sz="1800" spc="-1" strike="noStrike">
                           <a:solidFill>
@@ -10074,10 +10160,15 @@
                 </a:tc>
                 <a:tc>
                   <a:txBody>
-                    <a:bodyPr lIns="36000" rIns="36000" tIns="36000" bIns="36000" anchor="t">
+                    <a:bodyPr lIns="36000" rIns="36000" anchor="t">
                       <a:noAutofit/>
                     </a:bodyPr>
                     <a:p>
+                      <a:pPr>
+                        <a:lnSpc>
+                          <a:spcPct val="100000"/>
+                        </a:lnSpc>
+                      </a:pPr>
                       <a:r>
                         <a:rPr b="0" lang="en-US" sz="1800" spc="-1" strike="noStrike">
                           <a:solidFill>
@@ -10127,7 +10218,7 @@
               <a:tr h="0">
                 <a:tc>
                   <a:txBody>
-                    <a:bodyPr lIns="36000" rIns="36000" tIns="36000" bIns="36000" anchor="t">
+                    <a:bodyPr lIns="36000" rIns="36000" anchor="t">
                       <a:noAutofit/>
                     </a:bodyPr>
                     <a:p>
@@ -10169,10 +10260,15 @@
                 </a:tc>
                 <a:tc>
                   <a:txBody>
-                    <a:bodyPr lIns="36000" rIns="36000" tIns="36000" bIns="36000" anchor="t">
+                    <a:bodyPr lIns="36000" rIns="36000" anchor="t">
                       <a:noAutofit/>
                     </a:bodyPr>
                     <a:p>
+                      <a:pPr>
+                        <a:lnSpc>
+                          <a:spcPct val="100000"/>
+                        </a:lnSpc>
+                      </a:pPr>
                       <a:r>
                         <a:rPr b="0" lang="en-US" sz="1800" spc="-1" strike="noStrike">
                           <a:solidFill>
@@ -10220,10 +10316,15 @@
                 </a:tc>
                 <a:tc>
                   <a:txBody>
-                    <a:bodyPr lIns="36000" rIns="36000" tIns="36000" bIns="36000" anchor="t">
+                    <a:bodyPr lIns="36000" rIns="36000" anchor="t">
                       <a:noAutofit/>
                     </a:bodyPr>
                     <a:p>
+                      <a:pPr>
+                        <a:lnSpc>
+                          <a:spcPct val="100000"/>
+                        </a:lnSpc>
+                      </a:pPr>
                       <a:r>
                         <a:rPr b="0" lang="en-US" sz="1800" spc="-1" strike="noStrike">
                           <a:solidFill>
@@ -10241,6 +10342,11 @@
                       </a:endParaRPr>
                     </a:p>
                     <a:p>
+                      <a:pPr>
+                        <a:lnSpc>
+                          <a:spcPct val="100000"/>
+                        </a:lnSpc>
+                      </a:pPr>
                       <a:r>
                         <a:rPr b="0" lang="en-US" sz="1800" spc="-1" strike="noStrike">
                           <a:solidFill>
@@ -10258,6 +10364,11 @@
                       </a:endParaRPr>
                     </a:p>
                     <a:p>
+                      <a:pPr>
+                        <a:lnSpc>
+                          <a:spcPct val="100000"/>
+                        </a:lnSpc>
+                      </a:pPr>
                       <a:r>
                         <a:rPr b="0" lang="en-US" sz="1800" spc="-1" strike="noStrike">
                           <a:solidFill>
@@ -10305,7 +10416,7 @@
                 </a:tc>
                 <a:tc>
                   <a:txBody>
-                    <a:bodyPr lIns="36000" rIns="36000" tIns="36000" bIns="36000" anchor="t">
+                    <a:bodyPr lIns="36000" rIns="36000" anchor="t">
                       <a:noAutofit/>
                     </a:bodyPr>
                     <a:p>
@@ -10347,7 +10458,7 @@
                 </a:tc>
                 <a:tc>
                   <a:txBody>
-                    <a:bodyPr lIns="36000" rIns="36000" tIns="36000" bIns="36000" anchor="t">
+                    <a:bodyPr lIns="36000" rIns="36000" anchor="t">
                       <a:noAutofit/>
                     </a:bodyPr>
                     <a:p>
@@ -10391,7 +10502,7 @@
               <a:tr h="0">
                 <a:tc>
                   <a:txBody>
-                    <a:bodyPr lIns="36000" rIns="36000" tIns="36000" bIns="36000" anchor="t">
+                    <a:bodyPr lIns="36000" rIns="36000" anchor="t">
                       <a:noAutofit/>
                     </a:bodyPr>
                     <a:p>
@@ -10433,10 +10544,15 @@
                 </a:tc>
                 <a:tc>
                   <a:txBody>
-                    <a:bodyPr lIns="36000" rIns="36000" tIns="36000" bIns="36000" anchor="t">
+                    <a:bodyPr lIns="36000" rIns="36000" anchor="t">
                       <a:noAutofit/>
                     </a:bodyPr>
                     <a:p>
+                      <a:pPr>
+                        <a:lnSpc>
+                          <a:spcPct val="100000"/>
+                        </a:lnSpc>
+                      </a:pPr>
                       <a:r>
                         <a:rPr b="0" lang="en-US" sz="1800" spc="-1" strike="noStrike">
                           <a:solidFill>
@@ -10484,10 +10600,15 @@
                 </a:tc>
                 <a:tc>
                   <a:txBody>
-                    <a:bodyPr lIns="36000" rIns="36000" tIns="36000" bIns="36000" anchor="t">
+                    <a:bodyPr lIns="36000" rIns="36000" anchor="t">
                       <a:noAutofit/>
                     </a:bodyPr>
                     <a:p>
+                      <a:pPr>
+                        <a:lnSpc>
+                          <a:spcPct val="100000"/>
+                        </a:lnSpc>
+                      </a:pPr>
                       <a:r>
                         <a:rPr b="0" lang="en-US" sz="1800" spc="-1" strike="noStrike">
                           <a:solidFill>
@@ -10505,6 +10626,11 @@
                       </a:endParaRPr>
                     </a:p>
                     <a:p>
+                      <a:pPr>
+                        <a:lnSpc>
+                          <a:spcPct val="100000"/>
+                        </a:lnSpc>
+                      </a:pPr>
                       <a:r>
                         <a:rPr b="0" lang="en-US" sz="1800" spc="-1" strike="noStrike">
                           <a:solidFill>
@@ -10522,6 +10648,11 @@
                       </a:endParaRPr>
                     </a:p>
                     <a:p>
+                      <a:pPr>
+                        <a:lnSpc>
+                          <a:spcPct val="100000"/>
+                        </a:lnSpc>
+                      </a:pPr>
                       <a:r>
                         <a:rPr b="0" lang="en-US" sz="1800" spc="-1" strike="noStrike">
                           <a:solidFill>
@@ -10569,7 +10700,7 @@
                 </a:tc>
                 <a:tc>
                   <a:txBody>
-                    <a:bodyPr lIns="36000" rIns="36000" tIns="36000" bIns="36000" anchor="t">
+                    <a:bodyPr lIns="36000" rIns="36000" anchor="t">
                       <a:noAutofit/>
                     </a:bodyPr>
                     <a:p>
@@ -10611,7 +10742,7 @@
                 </a:tc>
                 <a:tc>
                   <a:txBody>
-                    <a:bodyPr lIns="36000" rIns="36000" tIns="36000" bIns="36000" anchor="t">
+                    <a:bodyPr lIns="36000" rIns="36000" anchor="t">
                       <a:noAutofit/>
                     </a:bodyPr>
                     <a:p>
@@ -10655,7 +10786,7 @@
               <a:tr h="0">
                 <a:tc>
                   <a:txBody>
-                    <a:bodyPr lIns="36000" rIns="36000" tIns="36000" bIns="36000" anchor="t">
+                    <a:bodyPr lIns="36000" rIns="36000" anchor="t">
                       <a:noAutofit/>
                     </a:bodyPr>
                     <a:p>
@@ -10697,7 +10828,7 @@
                 </a:tc>
                 <a:tc>
                   <a:txBody>
-                    <a:bodyPr lIns="36000" rIns="36000" tIns="36000" bIns="36000" anchor="t">
+                    <a:bodyPr lIns="36000" rIns="36000" anchor="t">
                       <a:noAutofit/>
                     </a:bodyPr>
                     <a:p>
@@ -10739,7 +10870,7 @@
                 </a:tc>
                 <a:tc>
                   <a:txBody>
-                    <a:bodyPr lIns="36000" rIns="36000" tIns="36000" bIns="36000" anchor="t">
+                    <a:bodyPr lIns="36000" rIns="36000" anchor="t">
                       <a:noAutofit/>
                     </a:bodyPr>
                     <a:p>
@@ -10781,7 +10912,7 @@
                 </a:tc>
                 <a:tc>
                   <a:txBody>
-                    <a:bodyPr lIns="36000" rIns="36000" tIns="36000" bIns="36000" anchor="t">
+                    <a:bodyPr lIns="36000" rIns="36000" anchor="t">
                       <a:noAutofit/>
                     </a:bodyPr>
                     <a:p>
@@ -10823,7 +10954,7 @@
                 </a:tc>
                 <a:tc>
                   <a:txBody>
-                    <a:bodyPr lIns="36000" rIns="36000" tIns="36000" bIns="36000" anchor="t">
+                    <a:bodyPr lIns="36000" rIns="36000" anchor="t">
                       <a:noAutofit/>
                     </a:bodyPr>
                     <a:p>

</xml_diff>